<commit_message>
first slide edits in a while
</commit_message>
<xml_diff>
--- a/slides/voysey-thesis.pptx
+++ b/slides/voysey-thesis.pptx
@@ -5,14 +5,18 @@
     <p:sldMasterId id="2147483648" r:id="rId1"/>
   </p:sldMasterIdLst>
   <p:notesMasterIdLst>
-    <p:notesMasterId r:id="rId4"/>
+    <p:notesMasterId r:id="rId8"/>
   </p:notesMasterIdLst>
   <p:handoutMasterIdLst>
-    <p:handoutMasterId r:id="rId5"/>
+    <p:handoutMasterId r:id="rId9"/>
   </p:handoutMasterIdLst>
   <p:sldIdLst>
-    <p:sldId id="256" r:id="rId2"/>
-    <p:sldId id="257" r:id="rId3"/>
+    <p:sldId id="259" r:id="rId2"/>
+    <p:sldId id="260" r:id="rId3"/>
+    <p:sldId id="261" r:id="rId4"/>
+    <p:sldId id="262" r:id="rId5"/>
+    <p:sldId id="263" r:id="rId6"/>
+    <p:sldId id="258" r:id="rId7"/>
   </p:sldIdLst>
   <p:sldSz cx="9144000" cy="6858000" type="screen4x3"/>
   <p:notesSz cx="6858000" cy="9144000"/>
@@ -492,7 +496,7 @@
         <p:nvSpPr>
           <p:cNvPr id="5124" name="Rectangle 4"/>
           <p:cNvSpPr>
-            <a:spLocks noChangeArrowheads="1" noTextEdit="1"/>
+            <a:spLocks noGrp="1" noRot="1" noChangeAspect="1" noChangeArrowheads="1" noTextEdit="1"/>
           </p:cNvSpPr>
           <p:nvPr>
             <p:ph type="sldImg" idx="2"/>
@@ -516,7 +520,7 @@
             <a:tailEnd/>
           </a:ln>
           <a:extLst>
-            <a:ext uri="{909E8E84-426E-40DD-AFC4-6F175D3DCCD1}">
+            <a:ext uri="{909E8E84-426E-40dd-AFC4-6F175D3DCCD1}">
               <a14:hiddenFill xmlns:a14="http://schemas.microsoft.com/office/drawing/2010/main">
                 <a:solidFill>
                   <a:srgbClr val="FFFFFF"/>
@@ -860,14 +864,14 @@
           <a:noFill/>
           <a:ln/>
           <a:extLst>
-            <a:ext uri="{909E8E84-426E-40DD-AFC4-6F175D3DCCD1}">
+            <a:ext uri="{909E8E84-426E-40dd-AFC4-6F175D3DCCD1}">
               <a14:hiddenFill xmlns:a14="http://schemas.microsoft.com/office/drawing/2010/main">
                 <a:solidFill>
                   <a:srgbClr val="FFFFFF"/>
                 </a:solidFill>
               </a14:hiddenFill>
             </a:ext>
-            <a:ext uri="{91240B29-F687-4F45-9708-019B960494DF}">
+            <a:ext uri="{91240B29-F687-4f45-9708-019B960494DF}">
               <a14:hiddenLine xmlns:a14="http://schemas.microsoft.com/office/drawing/2010/main" w="9525">
                 <a:solidFill>
                   <a:srgbClr val="000000"/>
@@ -1002,7 +1006,7 @@
         <p:nvSpPr>
           <p:cNvPr id="6147" name="Rectangle 2"/>
           <p:cNvSpPr>
-            <a:spLocks noChangeArrowheads="1" noTextEdit="1"/>
+            <a:spLocks noGrp="1" noRot="1" noChangeAspect="1" noChangeArrowheads="1" noTextEdit="1"/>
           </p:cNvSpPr>
           <p:nvPr>
             <p:ph type="sldImg"/>
@@ -1026,14 +1030,14 @@
           <a:noFill/>
           <a:ln/>
           <a:extLst>
-            <a:ext uri="{909E8E84-426E-40DD-AFC4-6F175D3DCCD1}">
+            <a:ext uri="{909E8E84-426E-40dd-AFC4-6F175D3DCCD1}">
               <a14:hiddenFill xmlns:a14="http://schemas.microsoft.com/office/drawing/2010/main">
                 <a:solidFill>
                   <a:srgbClr val="FFFFFF"/>
                 </a:solidFill>
               </a14:hiddenFill>
             </a:ext>
-            <a:ext uri="{91240B29-F687-4F45-9708-019B960494DF}">
+            <a:ext uri="{91240B29-F687-4f45-9708-019B960494DF}">
               <a14:hiddenLine xmlns:a14="http://schemas.microsoft.com/office/drawing/2010/main" w="9525">
                 <a:solidFill>
                   <a:srgbClr val="000000"/>
@@ -1051,241 +1055,6 @@
           <a:p>
             <a:pPr eaLnBrk="1" hangingPunct="1"/>
             <a:endParaRPr lang="en-US" altLang="en-US" smtClean="0"/>
-          </a:p>
-        </p:txBody>
-      </p:sp>
-    </p:spTree>
-  </p:cSld>
-  <p:clrMapOvr>
-    <a:masterClrMapping/>
-  </p:clrMapOvr>
-</p:notes>
-</file>
-
-<file path=ppt/notesSlides/notesSlide2.xml><?xml version="1.0" encoding="utf-8"?>
-<p:notes xmlns:a="http://schemas.openxmlformats.org/drawingml/2006/main" xmlns:r="http://schemas.openxmlformats.org/officeDocument/2006/relationships" xmlns:p="http://schemas.openxmlformats.org/presentationml/2006/main">
-  <p:cSld>
-    <p:spTree>
-      <p:nvGrpSpPr>
-        <p:cNvPr id="1" name=""/>
-        <p:cNvGrpSpPr/>
-        <p:nvPr/>
-      </p:nvGrpSpPr>
-      <p:grpSpPr>
-        <a:xfrm>
-          <a:off x="0" y="0"/>
-          <a:ext cx="0" cy="0"/>
-          <a:chOff x="0" y="0"/>
-          <a:chExt cx="0" cy="0"/>
-        </a:xfrm>
-      </p:grpSpPr>
-      <p:sp>
-        <p:nvSpPr>
-          <p:cNvPr id="7170" name="Rectangle 7"/>
-          <p:cNvSpPr>
-            <a:spLocks noGrp="1" noChangeArrowheads="1"/>
-          </p:cNvSpPr>
-          <p:nvPr>
-            <p:ph type="sldNum" sz="quarter" idx="5"/>
-          </p:nvPr>
-        </p:nvSpPr>
-        <p:spPr>
-          <a:noFill/>
-          <a:ln/>
-          <a:extLst>
-            <a:ext uri="{909E8E84-426E-40DD-AFC4-6F175D3DCCD1}">
-              <a14:hiddenFill xmlns:a14="http://schemas.microsoft.com/office/drawing/2010/main">
-                <a:solidFill>
-                  <a:srgbClr val="FFFFFF"/>
-                </a:solidFill>
-              </a14:hiddenFill>
-            </a:ext>
-            <a:ext uri="{91240B29-F687-4F45-9708-019B960494DF}">
-              <a14:hiddenLine xmlns:a14="http://schemas.microsoft.com/office/drawing/2010/main" w="9525">
-                <a:solidFill>
-                  <a:srgbClr val="000000"/>
-                </a:solidFill>
-                <a:miter lim="800000"/>
-                <a:headEnd/>
-                <a:tailEnd/>
-              </a14:hiddenLine>
-            </a:ext>
-          </a:extLst>
-        </p:spPr>
-        <p:txBody>
-          <a:bodyPr/>
-          <a:lstStyle>
-            <a:lvl1pPr>
-              <a:defRPr sz="2400">
-                <a:solidFill>
-                  <a:schemeClr val="tx1"/>
-                </a:solidFill>
-                <a:latin typeface="Times" charset="0"/>
-                <a:ea typeface="Osaka" charset="-128"/>
-              </a:defRPr>
-            </a:lvl1pPr>
-            <a:lvl2pPr marL="37931725" indent="-37474525">
-              <a:defRPr sz="2400">
-                <a:solidFill>
-                  <a:schemeClr val="tx1"/>
-                </a:solidFill>
-                <a:latin typeface="Times" charset="0"/>
-                <a:ea typeface="Osaka" charset="-128"/>
-              </a:defRPr>
-            </a:lvl2pPr>
-            <a:lvl3pPr marL="1143000" indent="-228600">
-              <a:defRPr sz="2400">
-                <a:solidFill>
-                  <a:schemeClr val="tx1"/>
-                </a:solidFill>
-                <a:latin typeface="Times" charset="0"/>
-                <a:ea typeface="Osaka" charset="-128"/>
-              </a:defRPr>
-            </a:lvl3pPr>
-            <a:lvl4pPr marL="1600200" indent="-228600">
-              <a:defRPr sz="2400">
-                <a:solidFill>
-                  <a:schemeClr val="tx1"/>
-                </a:solidFill>
-                <a:latin typeface="Times" charset="0"/>
-                <a:ea typeface="Osaka" charset="-128"/>
-              </a:defRPr>
-            </a:lvl4pPr>
-            <a:lvl5pPr marL="2057400" indent="-228600">
-              <a:defRPr sz="2400">
-                <a:solidFill>
-                  <a:schemeClr val="tx1"/>
-                </a:solidFill>
-                <a:latin typeface="Times" charset="0"/>
-                <a:ea typeface="Osaka" charset="-128"/>
-              </a:defRPr>
-            </a:lvl5pPr>
-            <a:lvl6pPr marL="2514600" indent="-228600" eaLnBrk="0" fontAlgn="base" hangingPunct="0">
-              <a:spcBef>
-                <a:spcPct val="0"/>
-              </a:spcBef>
-              <a:spcAft>
-                <a:spcPct val="0"/>
-              </a:spcAft>
-              <a:defRPr sz="2400">
-                <a:solidFill>
-                  <a:schemeClr val="tx1"/>
-                </a:solidFill>
-                <a:latin typeface="Times" charset="0"/>
-                <a:ea typeface="Osaka" charset="-128"/>
-              </a:defRPr>
-            </a:lvl6pPr>
-            <a:lvl7pPr marL="2971800" indent="-228600" eaLnBrk="0" fontAlgn="base" hangingPunct="0">
-              <a:spcBef>
-                <a:spcPct val="0"/>
-              </a:spcBef>
-              <a:spcAft>
-                <a:spcPct val="0"/>
-              </a:spcAft>
-              <a:defRPr sz="2400">
-                <a:solidFill>
-                  <a:schemeClr val="tx1"/>
-                </a:solidFill>
-                <a:latin typeface="Times" charset="0"/>
-                <a:ea typeface="Osaka" charset="-128"/>
-              </a:defRPr>
-            </a:lvl7pPr>
-            <a:lvl8pPr marL="3429000" indent="-228600" eaLnBrk="0" fontAlgn="base" hangingPunct="0">
-              <a:spcBef>
-                <a:spcPct val="0"/>
-              </a:spcBef>
-              <a:spcAft>
-                <a:spcPct val="0"/>
-              </a:spcAft>
-              <a:defRPr sz="2400">
-                <a:solidFill>
-                  <a:schemeClr val="tx1"/>
-                </a:solidFill>
-                <a:latin typeface="Times" charset="0"/>
-                <a:ea typeface="Osaka" charset="-128"/>
-              </a:defRPr>
-            </a:lvl8pPr>
-            <a:lvl9pPr marL="3886200" indent="-228600" eaLnBrk="0" fontAlgn="base" hangingPunct="0">
-              <a:spcBef>
-                <a:spcPct val="0"/>
-              </a:spcBef>
-              <a:spcAft>
-                <a:spcPct val="0"/>
-              </a:spcAft>
-              <a:defRPr sz="2400">
-                <a:solidFill>
-                  <a:schemeClr val="tx1"/>
-                </a:solidFill>
-                <a:latin typeface="Times" charset="0"/>
-                <a:ea typeface="Osaka" charset="-128"/>
-              </a:defRPr>
-            </a:lvl9pPr>
-          </a:lstStyle>
-          <a:p>
-            <a:fld id="{813FCA61-0AA1-4146-A389-C34EDFA566DD}" type="slidenum">
-              <a:rPr lang="en-US" altLang="en-US" sz="1200"/>
-              <a:pPr/>
-              <a:t>2</a:t>
-            </a:fld>
-            <a:endParaRPr lang="en-US" altLang="en-US" sz="1200"/>
-          </a:p>
-        </p:txBody>
-      </p:sp>
-      <p:sp>
-        <p:nvSpPr>
-          <p:cNvPr id="7171" name="Rectangle 2"/>
-          <p:cNvSpPr>
-            <a:spLocks noChangeArrowheads="1" noTextEdit="1"/>
-          </p:cNvSpPr>
-          <p:nvPr>
-            <p:ph type="sldImg"/>
-          </p:nvPr>
-        </p:nvSpPr>
-        <p:spPr>
-          <a:ln/>
-        </p:spPr>
-      </p:sp>
-      <p:sp>
-        <p:nvSpPr>
-          <p:cNvPr id="7172" name="Rectangle 3"/>
-          <p:cNvSpPr>
-            <a:spLocks noGrp="1" noChangeArrowheads="1"/>
-          </p:cNvSpPr>
-          <p:nvPr>
-            <p:ph type="body" idx="1"/>
-          </p:nvPr>
-        </p:nvSpPr>
-        <p:spPr>
-          <a:noFill/>
-          <a:ln/>
-          <a:extLst>
-            <a:ext uri="{909E8E84-426E-40DD-AFC4-6F175D3DCCD1}">
-              <a14:hiddenFill xmlns:a14="http://schemas.microsoft.com/office/drawing/2010/main">
-                <a:solidFill>
-                  <a:srgbClr val="FFFFFF"/>
-                </a:solidFill>
-              </a14:hiddenFill>
-            </a:ext>
-            <a:ext uri="{91240B29-F687-4F45-9708-019B960494DF}">
-              <a14:hiddenLine xmlns:a14="http://schemas.microsoft.com/office/drawing/2010/main" w="9525">
-                <a:solidFill>
-                  <a:srgbClr val="000000"/>
-                </a:solidFill>
-                <a:miter lim="800000"/>
-                <a:headEnd/>
-                <a:tailEnd/>
-              </a14:hiddenLine>
-            </a:ext>
-          </a:extLst>
-        </p:spPr>
-        <p:txBody>
-          <a:bodyPr/>
-          <a:lstStyle/>
-          <a:p>
-            <a:pPr eaLnBrk="1" hangingPunct="1"/>
-            <a:endParaRPr lang="en-US" altLang="en-US" smtClean="0">
-              <a:latin typeface="Arial" charset="0"/>
-            </a:endParaRPr>
           </a:p>
         </p:txBody>
       </p:sp>
@@ -1636,7 +1405,7 @@
             <a:tailEnd/>
           </a:ln>
           <a:extLst>
-            <a:ext uri="{909E8E84-426E-40DD-AFC4-6F175D3DCCD1}">
+            <a:ext uri="{909E8E84-426E-40dd-AFC4-6F175D3DCCD1}">
               <a14:hiddenFill xmlns:a14="http://schemas.microsoft.com/office/drawing/2010/main">
                 <a:noFill/>
               </a14:hiddenFill>
@@ -1685,14 +1454,14 @@
             <a:noFill/>
           </a:ln>
           <a:extLst>
-            <a:ext uri="{909E8E84-426E-40DD-AFC4-6F175D3DCCD1}">
+            <a:ext uri="{909E8E84-426E-40dd-AFC4-6F175D3DCCD1}">
               <a14:hiddenFill xmlns:a14="http://schemas.microsoft.com/office/drawing/2010/main">
                 <a:solidFill>
                   <a:srgbClr val="FFFFFF"/>
                 </a:solidFill>
               </a14:hiddenFill>
             </a:ext>
-            <a:ext uri="{91240B29-F687-4F45-9708-019B960494DF}">
+            <a:ext uri="{91240B29-F687-4f45-9708-019B960494DF}">
               <a14:hiddenLine xmlns:a14="http://schemas.microsoft.com/office/drawing/2010/main" w="9525">
                 <a:solidFill>
                   <a:srgbClr val="000000"/>
@@ -1975,7 +1744,7 @@
             </a:pPr>
             <a:fld id="{B8EFF239-E46C-4117-91BF-EDADFB47CAC8}" type="datetime1">
               <a:rPr lang="en-US" altLang="en-US" smtClean="0"/>
-              <a:t>Monday, 01 February 2016</a:t>
+              <a:t>8/9/16</a:t>
             </a:fld>
             <a:endParaRPr lang="en-US" altLang="en-US"/>
           </a:p>
@@ -2189,7 +1958,7 @@
             </a:pPr>
             <a:fld id="{3E5FD174-36E5-463D-ADFA-8360A831E519}" type="datetime1">
               <a:rPr lang="en-US" altLang="en-US" smtClean="0"/>
-              <a:t>Monday, 01 February 2016</a:t>
+              <a:t>8/9/16</a:t>
             </a:fld>
             <a:endParaRPr lang="en-US" altLang="en-US"/>
           </a:p>
@@ -2397,7 +2166,7 @@
             </a:pPr>
             <a:fld id="{A544915F-7309-4744-8FAD-0D6B1CB5A275}" type="datetime1">
               <a:rPr lang="en-US" altLang="en-US" smtClean="0"/>
-              <a:t>Monday, 01 February 2016</a:t>
+              <a:t>8/9/16</a:t>
             </a:fld>
             <a:endParaRPr lang="en-US" altLang="en-US"/>
           </a:p>
@@ -2623,7 +2392,7 @@
             </a:pPr>
             <a:fld id="{E6C6BFA3-5BAB-4227-B5CF-B2D608775F9E}" type="datetime1">
               <a:rPr lang="en-US" altLang="en-US" smtClean="0"/>
-              <a:t>Monday, 01 February 2016</a:t>
+              <a:t>8/9/16</a:t>
             </a:fld>
             <a:endParaRPr lang="en-US" altLang="en-US"/>
           </a:p>
@@ -2945,7 +2714,7 @@
             </a:pPr>
             <a:fld id="{C02B3D24-940F-4CA8-A245-415C5E0C7A5D}" type="datetime1">
               <a:rPr lang="en-US" altLang="en-US" smtClean="0"/>
-              <a:t>Monday, 01 February 2016</a:t>
+              <a:t>8/9/16</a:t>
             </a:fld>
             <a:endParaRPr lang="en-US" altLang="en-US"/>
           </a:p>
@@ -3406,7 +3175,7 @@
             </a:pPr>
             <a:fld id="{84056FFF-1CAF-480A-BD25-8C132B6C9519}" type="datetime1">
               <a:rPr lang="en-US" altLang="en-US" smtClean="0"/>
-              <a:t>Monday, 01 February 2016</a:t>
+              <a:t>8/9/16</a:t>
             </a:fld>
             <a:endParaRPr lang="en-US" altLang="en-US"/>
           </a:p>
@@ -3558,7 +3327,7 @@
             </a:pPr>
             <a:fld id="{CC02872F-3C46-4632-A0D0-C67EDB2B2691}" type="datetime1">
               <a:rPr lang="en-US" altLang="en-US" smtClean="0"/>
-              <a:t>Monday, 01 February 2016</a:t>
+              <a:t>8/9/16</a:t>
             </a:fld>
             <a:endParaRPr lang="en-US" altLang="en-US"/>
           </a:p>
@@ -3687,7 +3456,7 @@
             </a:pPr>
             <a:fld id="{B063A3BD-F745-4EC1-8838-FF51B39EF9F5}" type="datetime1">
               <a:rPr lang="en-US" altLang="en-US" smtClean="0"/>
-              <a:t>Monday, 01 February 2016</a:t>
+              <a:t>8/9/16</a:t>
             </a:fld>
             <a:endParaRPr lang="en-US" altLang="en-US"/>
           </a:p>
@@ -3998,7 +3767,7 @@
             </a:pPr>
             <a:fld id="{F43DD9DD-561F-44C9-90A4-C217ECD8A48A}" type="datetime1">
               <a:rPr lang="en-US" altLang="en-US" smtClean="0"/>
-              <a:t>Monday, 01 February 2016</a:t>
+              <a:t>8/9/16</a:t>
             </a:fld>
             <a:endParaRPr lang="en-US" altLang="en-US"/>
           </a:p>
@@ -4286,7 +4055,7 @@
             </a:pPr>
             <a:fld id="{1B5B985C-0DA9-4FAA-B2F2-BDCC6964FA4D}" type="datetime1">
               <a:rPr lang="en-US" altLang="en-US" smtClean="0"/>
-              <a:t>Monday, 01 February 2016</a:t>
+              <a:t>8/9/16</a:t>
             </a:fld>
             <a:endParaRPr lang="en-US" altLang="en-US"/>
           </a:p>
@@ -4505,14 +4274,14 @@
             <a:noFill/>
           </a:ln>
           <a:extLst>
-            <a:ext uri="{909E8E84-426E-40DD-AFC4-6F175D3DCCD1}">
+            <a:ext uri="{909E8E84-426E-40dd-AFC4-6F175D3DCCD1}">
               <a14:hiddenFill xmlns:a14="http://schemas.microsoft.com/office/drawing/2010/main">
                 <a:solidFill>
                   <a:srgbClr val="FFFFFF"/>
                 </a:solidFill>
               </a14:hiddenFill>
             </a:ext>
-            <a:ext uri="{91240B29-F687-4F45-9708-019B960494DF}">
+            <a:ext uri="{91240B29-F687-4f45-9708-019B960494DF}">
               <a14:hiddenLine xmlns:a14="http://schemas.microsoft.com/office/drawing/2010/main" w="9525">
                 <a:solidFill>
                   <a:srgbClr val="000000"/>
@@ -4563,14 +4332,14 @@
             <a:noFill/>
           </a:ln>
           <a:extLst>
-            <a:ext uri="{909E8E84-426E-40DD-AFC4-6F175D3DCCD1}">
+            <a:ext uri="{909E8E84-426E-40dd-AFC4-6F175D3DCCD1}">
               <a14:hiddenFill xmlns:a14="http://schemas.microsoft.com/office/drawing/2010/main">
                 <a:solidFill>
                   <a:srgbClr val="FFFFFF"/>
                 </a:solidFill>
               </a14:hiddenFill>
             </a:ext>
-            <a:ext uri="{91240B29-F687-4F45-9708-019B960494DF}">
+            <a:ext uri="{91240B29-F687-4f45-9708-019B960494DF}">
               <a14:hiddenLine xmlns:a14="http://schemas.microsoft.com/office/drawing/2010/main" w="9525">
                 <a:solidFill>
                   <a:srgbClr val="000000"/>
@@ -4792,7 +4561,7 @@
             </a:pPr>
             <a:fld id="{FCB6550E-5833-4993-BF34-C7DB2A6FD9A7}" type="datetime1">
               <a:rPr lang="en-US" altLang="en-US" smtClean="0"/>
-              <a:t>Monday, 01 February 2016</a:t>
+              <a:t>8/9/16</a:t>
             </a:fld>
             <a:endParaRPr lang="en-US" altLang="en-US" dirty="0"/>
           </a:p>
@@ -4844,14 +4613,14 @@
               <a:noFill/>
             </a:ln>
             <a:extLst>
-              <a:ext uri="{909E8E84-426E-40DD-AFC4-6F175D3DCCD1}">
+              <a:ext uri="{909E8E84-426E-40dd-AFC4-6F175D3DCCD1}">
                 <a14:hiddenFill xmlns:a14="http://schemas.microsoft.com/office/drawing/2010/main">
                   <a:solidFill>
                     <a:srgbClr val="FFFFFF"/>
                   </a:solidFill>
                 </a14:hiddenFill>
               </a:ext>
-              <a:ext uri="{91240B29-F687-4F45-9708-019B960494DF}">
+              <a:ext uri="{91240B29-F687-4f45-9708-019B960494DF}">
                 <a14:hiddenLine xmlns:a14="http://schemas.microsoft.com/office/drawing/2010/main" w="9525">
                   <a:solidFill>
                     <a:srgbClr val="000000"/>
@@ -5380,16 +5149,42 @@
             <p:ph type="ctrTitle"/>
           </p:nvPr>
         </p:nvSpPr>
-        <p:spPr/>
+        <p:spPr>
+          <a:xfrm>
+            <a:off x="304800" y="1524000"/>
+            <a:ext cx="8458200" cy="1143000"/>
+          </a:xfrm>
+        </p:spPr>
         <p:txBody>
           <a:bodyPr/>
           <a:lstStyle/>
           <a:p>
             <a:pPr eaLnBrk="1" hangingPunct="1"/>
             <a:r>
-              <a:rPr lang="en-US" altLang="en-US" smtClean="0"/>
-              <a:t>Presentation Title</a:t>
-            </a:r>
+              <a:rPr lang="en-US" dirty="0"/>
+              <a:t>Modeling the </a:t>
+            </a:r>
+            <a:r>
+              <a:rPr lang="en-US" dirty="0" smtClean="0"/>
+              <a:t>Effects </a:t>
+            </a:r>
+            <a:r>
+              <a:rPr lang="en-US" dirty="0"/>
+              <a:t>of Auditory </a:t>
+            </a:r>
+            <a:r>
+              <a:rPr lang="en-US" dirty="0" smtClean="0"/>
+              <a:t>Neuropathy </a:t>
+            </a:r>
+            <a:r>
+              <a:rPr lang="en-US" dirty="0"/>
+              <a:t>on the Auditory Brainstem </a:t>
+            </a:r>
+            <a:r>
+              <a:rPr lang="en-US" dirty="0" smtClean="0"/>
+              <a:t>Response</a:t>
+            </a:r>
+            <a:endParaRPr lang="en-US" altLang="en-US" dirty="0" smtClean="0"/>
           </a:p>
         </p:txBody>
       </p:sp>
@@ -5403,20 +5198,292 @@
             <p:ph type="subTitle" idx="1"/>
           </p:nvPr>
         </p:nvSpPr>
-        <p:spPr/>
+        <p:spPr>
+          <a:xfrm>
+            <a:off x="1333500" y="4800600"/>
+            <a:ext cx="6400800" cy="762000"/>
+          </a:xfrm>
+        </p:spPr>
         <p:txBody>
           <a:bodyPr/>
           <a:lstStyle/>
           <a:p>
             <a:pPr eaLnBrk="1" hangingPunct="1"/>
             <a:r>
-              <a:rPr lang="en-US" altLang="en-US" smtClean="0"/>
-              <a:t>Subtitle or Date</a:t>
+              <a:rPr lang="en-US" altLang="en-US" dirty="0" smtClean="0"/>
+              <a:t>M.S. Thesis Defense</a:t>
+            </a:r>
+            <a:endParaRPr lang="en-US" altLang="en-US" dirty="0" smtClean="0"/>
+          </a:p>
+          <a:p>
+            <a:pPr eaLnBrk="1" hangingPunct="1"/>
+            <a:r>
+              <a:rPr lang="en-US" altLang="en-US" dirty="0" smtClean="0"/>
+              <a:t>18 August, 2016</a:t>
+            </a:r>
+            <a:endParaRPr lang="en-US" altLang="en-US" dirty="0" smtClean="0"/>
+          </a:p>
+        </p:txBody>
+      </p:sp>
+      <p:sp>
+        <p:nvSpPr>
+          <p:cNvPr id="4" name="Rectangle 3"/>
+          <p:cNvSpPr txBox="1">
+            <a:spLocks noChangeArrowheads="1"/>
+          </p:cNvSpPr>
+          <p:nvPr/>
+        </p:nvSpPr>
+        <p:spPr bwMode="auto">
+          <a:xfrm>
+            <a:off x="1333500" y="3200400"/>
+            <a:ext cx="6400800" cy="1752600"/>
+          </a:xfrm>
+          <a:prstGeom prst="rect">
+            <a:avLst/>
+          </a:prstGeom>
+          <a:noFill/>
+          <a:ln>
+            <a:noFill/>
+          </a:ln>
+          <a:extLst>
+            <a:ext uri="{909E8E84-426E-40dd-AFC4-6F175D3DCCD1}">
+              <a14:hiddenFill xmlns:a14="http://schemas.microsoft.com/office/drawing/2010/main">
+                <a:solidFill>
+                  <a:srgbClr val="FFFFFF"/>
+                </a:solidFill>
+              </a14:hiddenFill>
+            </a:ext>
+            <a:ext uri="{91240B29-F687-4f45-9708-019B960494DF}">
+              <a14:hiddenLine xmlns:a14="http://schemas.microsoft.com/office/drawing/2010/main" w="9525">
+                <a:solidFill>
+                  <a:srgbClr val="000000"/>
+                </a:solidFill>
+                <a:miter lim="800000"/>
+                <a:headEnd/>
+                <a:tailEnd/>
+              </a14:hiddenLine>
+            </a:ext>
+          </a:extLst>
+        </p:spPr>
+        <p:txBody>
+          <a:bodyPr vert="horz" wrap="square" lIns="91440" tIns="45720" rIns="91440" bIns="45720" numCol="1" anchor="t" anchorCtr="0" compatLnSpc="1">
+            <a:prstTxWarp prst="textNoShape">
+              <a:avLst/>
+            </a:prstTxWarp>
+          </a:bodyPr>
+          <a:lstStyle>
+            <a:lvl1pPr marL="0" indent="0" algn="ctr" rtl="0" eaLnBrk="0" fontAlgn="base" hangingPunct="0">
+              <a:spcBef>
+                <a:spcPct val="20000"/>
+              </a:spcBef>
+              <a:spcAft>
+                <a:spcPct val="0"/>
+              </a:spcAft>
+              <a:buClr>
+                <a:srgbClr val="2675B4"/>
+              </a:buClr>
+              <a:buFont typeface="Wingdings" charset="2"/>
+              <a:buNone/>
+              <a:defRPr sz="2400">
+                <a:solidFill>
+                  <a:srgbClr val="CCCCCC"/>
+                </a:solidFill>
+                <a:latin typeface="+mn-lt"/>
+                <a:ea typeface="+mn-ea"/>
+                <a:cs typeface="+mn-cs"/>
+              </a:defRPr>
+            </a:lvl1pPr>
+            <a:lvl2pPr marL="742950" indent="-285750" algn="l" rtl="0" eaLnBrk="0" fontAlgn="base" hangingPunct="0">
+              <a:spcBef>
+                <a:spcPct val="20000"/>
+              </a:spcBef>
+              <a:spcAft>
+                <a:spcPct val="0"/>
+              </a:spcAft>
+              <a:buClr>
+                <a:srgbClr val="2675B4"/>
+              </a:buClr>
+              <a:buFont typeface="Wingdings" charset="2"/>
+              <a:buChar char="§"/>
+              <a:defRPr>
+                <a:solidFill>
+                  <a:schemeClr val="tx1"/>
+                </a:solidFill>
+                <a:latin typeface="+mn-lt"/>
+                <a:ea typeface="+mn-ea"/>
+                <a:cs typeface="+mn-cs"/>
+              </a:defRPr>
+            </a:lvl2pPr>
+            <a:lvl3pPr marL="1143000" indent="-228600" algn="l" rtl="0" eaLnBrk="0" fontAlgn="base" hangingPunct="0">
+              <a:spcBef>
+                <a:spcPct val="20000"/>
+              </a:spcBef>
+              <a:spcAft>
+                <a:spcPct val="0"/>
+              </a:spcAft>
+              <a:buClr>
+                <a:srgbClr val="2675B4"/>
+              </a:buClr>
+              <a:buFont typeface="Wingdings" charset="2"/>
+              <a:buChar char="§"/>
+              <a:defRPr>
+                <a:solidFill>
+                  <a:schemeClr val="tx1"/>
+                </a:solidFill>
+                <a:latin typeface="+mn-lt"/>
+                <a:ea typeface="+mn-ea"/>
+                <a:cs typeface="+mn-cs"/>
+              </a:defRPr>
+            </a:lvl3pPr>
+            <a:lvl4pPr marL="1600200" indent="-228600" algn="l" rtl="0" eaLnBrk="0" fontAlgn="base" hangingPunct="0">
+              <a:spcBef>
+                <a:spcPct val="20000"/>
+              </a:spcBef>
+              <a:spcAft>
+                <a:spcPct val="0"/>
+              </a:spcAft>
+              <a:buClr>
+                <a:srgbClr val="2675B4"/>
+              </a:buClr>
+              <a:buFont typeface="Wingdings" charset="2"/>
+              <a:buChar char="§"/>
+              <a:defRPr>
+                <a:solidFill>
+                  <a:schemeClr val="tx1"/>
+                </a:solidFill>
+                <a:latin typeface="+mn-lt"/>
+                <a:ea typeface="+mn-ea"/>
+                <a:cs typeface="+mn-cs"/>
+              </a:defRPr>
+            </a:lvl4pPr>
+            <a:lvl5pPr marL="2057400" indent="-228600" algn="l" rtl="0" eaLnBrk="0" fontAlgn="base" hangingPunct="0">
+              <a:spcBef>
+                <a:spcPct val="20000"/>
+              </a:spcBef>
+              <a:spcAft>
+                <a:spcPct val="0"/>
+              </a:spcAft>
+              <a:buClr>
+                <a:srgbClr val="2675B4"/>
+              </a:buClr>
+              <a:buFont typeface="Wingdings" charset="2"/>
+              <a:buChar char="§"/>
+              <a:defRPr>
+                <a:solidFill>
+                  <a:schemeClr val="tx1"/>
+                </a:solidFill>
+                <a:latin typeface="+mn-lt"/>
+                <a:ea typeface="+mn-ea"/>
+                <a:cs typeface="+mn-cs"/>
+              </a:defRPr>
+            </a:lvl5pPr>
+            <a:lvl6pPr marL="2514600" indent="-228600" algn="l" rtl="0" fontAlgn="base">
+              <a:spcBef>
+                <a:spcPct val="20000"/>
+              </a:spcBef>
+              <a:spcAft>
+                <a:spcPct val="0"/>
+              </a:spcAft>
+              <a:buClr>
+                <a:srgbClr val="2675B4"/>
+              </a:buClr>
+              <a:buFont typeface="Wingdings" charset="2"/>
+              <a:buChar char="§"/>
+              <a:defRPr>
+                <a:solidFill>
+                  <a:schemeClr val="tx1"/>
+                </a:solidFill>
+                <a:latin typeface="+mn-lt"/>
+                <a:ea typeface="+mn-ea"/>
+                <a:cs typeface="+mn-cs"/>
+              </a:defRPr>
+            </a:lvl6pPr>
+            <a:lvl7pPr marL="2971800" indent="-228600" algn="l" rtl="0" fontAlgn="base">
+              <a:spcBef>
+                <a:spcPct val="20000"/>
+              </a:spcBef>
+              <a:spcAft>
+                <a:spcPct val="0"/>
+              </a:spcAft>
+              <a:buClr>
+                <a:srgbClr val="2675B4"/>
+              </a:buClr>
+              <a:buFont typeface="Wingdings" charset="2"/>
+              <a:buChar char="§"/>
+              <a:defRPr>
+                <a:solidFill>
+                  <a:schemeClr val="tx1"/>
+                </a:solidFill>
+                <a:latin typeface="+mn-lt"/>
+                <a:ea typeface="+mn-ea"/>
+                <a:cs typeface="+mn-cs"/>
+              </a:defRPr>
+            </a:lvl7pPr>
+            <a:lvl8pPr marL="3429000" indent="-228600" algn="l" rtl="0" fontAlgn="base">
+              <a:spcBef>
+                <a:spcPct val="20000"/>
+              </a:spcBef>
+              <a:spcAft>
+                <a:spcPct val="0"/>
+              </a:spcAft>
+              <a:buClr>
+                <a:srgbClr val="2675B4"/>
+              </a:buClr>
+              <a:buFont typeface="Wingdings" charset="2"/>
+              <a:buChar char="§"/>
+              <a:defRPr>
+                <a:solidFill>
+                  <a:schemeClr val="tx1"/>
+                </a:solidFill>
+                <a:latin typeface="+mn-lt"/>
+                <a:ea typeface="+mn-ea"/>
+                <a:cs typeface="+mn-cs"/>
+              </a:defRPr>
+            </a:lvl8pPr>
+            <a:lvl9pPr marL="3886200" indent="-228600" algn="l" rtl="0" fontAlgn="base">
+              <a:spcBef>
+                <a:spcPct val="20000"/>
+              </a:spcBef>
+              <a:spcAft>
+                <a:spcPct val="0"/>
+              </a:spcAft>
+              <a:buClr>
+                <a:srgbClr val="2675B4"/>
+              </a:buClr>
+              <a:buFont typeface="Wingdings" charset="2"/>
+              <a:buChar char="§"/>
+              <a:defRPr>
+                <a:solidFill>
+                  <a:schemeClr val="tx1"/>
+                </a:solidFill>
+                <a:latin typeface="+mn-lt"/>
+                <a:ea typeface="+mn-ea"/>
+                <a:cs typeface="+mn-cs"/>
+              </a:defRPr>
+            </a:lvl9pPr>
+          </a:lstStyle>
+          <a:p>
+            <a:pPr eaLnBrk="1" hangingPunct="1"/>
+            <a:r>
+              <a:rPr lang="en-US" altLang="en-US" kern="0" dirty="0" smtClean="0"/>
+              <a:t>Graham Voysey</a:t>
+            </a:r>
+          </a:p>
+          <a:p>
+            <a:pPr eaLnBrk="1" hangingPunct="1"/>
+            <a:r>
+              <a:rPr lang="en-US" altLang="en-US" kern="0" dirty="0" smtClean="0"/>
+              <a:t>Binaural Hearing Lab</a:t>
             </a:r>
           </a:p>
         </p:txBody>
       </p:sp>
     </p:spTree>
+    <p:extLst>
+      <p:ext uri="{BB962C8B-B14F-4D97-AF65-F5344CB8AC3E}">
+        <p14:creationId xmlns:p14="http://schemas.microsoft.com/office/powerpoint/2010/main" val="407703872"/>
+      </p:ext>
+    </p:extLst>
   </p:cSld>
   <p:clrMapOvr>
     <a:masterClrMapping/>
@@ -5424,7 +5491,7 @@
   <p:timing>
     <p:tnLst>
       <p:par>
-        <p:cTn id="1" dur="indefinite" restart="never" nodeType="tmRoot"/>
+        <p:cTn xmlns:p14="http://schemas.microsoft.com/office/powerpoint/2010/main" id="1" dur="indefinite" restart="never" nodeType="tmRoot"/>
       </p:par>
     </p:tnLst>
   </p:timing>
@@ -5450,26 +5517,1053 @@
       </p:grpSpPr>
       <p:sp>
         <p:nvSpPr>
-          <p:cNvPr id="4098" name="Footer Placeholder 3"/>
+          <p:cNvPr id="2" name="Title 1"/>
           <p:cNvSpPr>
             <a:spLocks noGrp="1"/>
           </p:cNvSpPr>
           <p:nvPr>
+            <p:ph type="title"/>
+          </p:nvPr>
+        </p:nvSpPr>
+        <p:spPr/>
+        <p:txBody>
+          <a:bodyPr/>
+          <a:lstStyle/>
+          <a:p>
+            <a:r>
+              <a:rPr lang="en-US" dirty="0" smtClean="0"/>
+              <a:t>Motivation</a:t>
+            </a:r>
+            <a:endParaRPr lang="en-US" dirty="0"/>
+          </a:p>
+        </p:txBody>
+      </p:sp>
+      <p:sp>
+        <p:nvSpPr>
+          <p:cNvPr id="3" name="Content Placeholder 2"/>
+          <p:cNvSpPr>
+            <a:spLocks noGrp="1"/>
+          </p:cNvSpPr>
+          <p:nvPr>
+            <p:ph idx="1"/>
+          </p:nvPr>
+        </p:nvSpPr>
+        <p:spPr/>
+        <p:txBody>
+          <a:bodyPr/>
+          <a:lstStyle/>
+          <a:p>
+            <a:pPr marL="0" indent="0">
+              <a:buNone/>
+            </a:pPr>
+            <a:endParaRPr lang="en-US" dirty="0"/>
+          </a:p>
+          <a:p>
+            <a:pPr marL="0" indent="0">
+              <a:buNone/>
+            </a:pPr>
+            <a:r>
+              <a:rPr lang="en-US" dirty="0" smtClean="0"/>
+              <a:t>So </a:t>
+            </a:r>
+            <a:r>
+              <a:rPr lang="en-US" dirty="0"/>
+              <a:t>I can ask this question two ways, but let me ask it this way: </a:t>
+            </a:r>
+            <a:r>
+              <a:rPr lang="en-US" i="1" dirty="0" smtClean="0"/>
+              <a:t>What </a:t>
+            </a:r>
+            <a:r>
+              <a:rPr lang="en-US" i="1" dirty="0"/>
+              <a:t>should we leave in</a:t>
+            </a:r>
+            <a:r>
+              <a:rPr lang="en-US" i="1" dirty="0" smtClean="0"/>
+              <a:t>?</a:t>
+            </a:r>
+            <a:r>
+              <a:rPr lang="en-US" dirty="0" smtClean="0"/>
+              <a:t> </a:t>
+            </a:r>
+            <a:r>
+              <a:rPr lang="en-US" dirty="0"/>
+              <a:t>What's the bare minimum we should leave in as we try to understand what's important about the function of the cochlea</a:t>
+            </a:r>
+            <a:r>
+              <a:rPr lang="en-US" dirty="0" smtClean="0"/>
+              <a:t>?</a:t>
+            </a:r>
+          </a:p>
+          <a:p>
+            <a:pPr marL="0" indent="0">
+              <a:buNone/>
+            </a:pPr>
+            <a:endParaRPr lang="en-US" dirty="0"/>
+          </a:p>
+          <a:p>
+            <a:pPr marL="0" indent="0" algn="r">
+              <a:buNone/>
+            </a:pPr>
+            <a:r>
+              <a:rPr lang="en-US" dirty="0" smtClean="0"/>
+              <a:t>-- David Mountain, 2014</a:t>
+            </a:r>
+            <a:endParaRPr lang="en-US" dirty="0"/>
+          </a:p>
+        </p:txBody>
+      </p:sp>
+      <p:sp>
+        <p:nvSpPr>
+          <p:cNvPr id="4" name="Footer Placeholder 3"/>
+          <p:cNvSpPr>
+            <a:spLocks noGrp="1"/>
+          </p:cNvSpPr>
+          <p:nvPr>
             <p:ph type="ftr" sz="quarter" idx="10"/>
           </p:nvPr>
         </p:nvSpPr>
+        <p:spPr/>
+        <p:txBody>
+          <a:bodyPr/>
+          <a:lstStyle/>
+          <a:p>
+            <a:pPr>
+              <a:defRPr/>
+            </a:pPr>
+            <a:r>
+              <a:rPr lang="en-US" altLang="en-US" smtClean="0"/>
+              <a:t>Presentation Title</a:t>
+            </a:r>
+            <a:endParaRPr lang="en-US" altLang="en-US"/>
+          </a:p>
+        </p:txBody>
+      </p:sp>
+      <p:sp>
+        <p:nvSpPr>
+          <p:cNvPr id="5" name="Slide Number Placeholder 4"/>
+          <p:cNvSpPr>
+            <a:spLocks noGrp="1"/>
+          </p:cNvSpPr>
+          <p:nvPr>
+            <p:ph type="sldNum" sz="quarter" idx="11"/>
+          </p:nvPr>
+        </p:nvSpPr>
+        <p:spPr/>
+        <p:txBody>
+          <a:bodyPr/>
+          <a:lstStyle/>
+          <a:p>
+            <a:pPr>
+              <a:defRPr/>
+            </a:pPr>
+            <a:fld id="{8840E231-D218-4982-B1DE-6520F190699A}" type="slidenum">
+              <a:rPr lang="en-US" altLang="en-US" smtClean="0"/>
+              <a:pPr>
+                <a:defRPr/>
+              </a:pPr>
+              <a:t>2</a:t>
+            </a:fld>
+            <a:endParaRPr lang="en-US" altLang="en-US" dirty="0"/>
+          </a:p>
+        </p:txBody>
+      </p:sp>
+      <p:sp>
+        <p:nvSpPr>
+          <p:cNvPr id="6" name="Date Placeholder 5"/>
+          <p:cNvSpPr>
+            <a:spLocks noGrp="1"/>
+          </p:cNvSpPr>
+          <p:nvPr>
+            <p:ph type="dt" sz="half" idx="12"/>
+          </p:nvPr>
+        </p:nvSpPr>
+        <p:spPr/>
+        <p:txBody>
+          <a:bodyPr/>
+          <a:lstStyle/>
+          <a:p>
+            <a:pPr>
+              <a:defRPr/>
+            </a:pPr>
+            <a:fld id="{A544915F-7309-4744-8FAD-0D6B1CB5A275}" type="datetime1">
+              <a:rPr lang="en-US" altLang="en-US" smtClean="0"/>
+              <a:t>8/9/16</a:t>
+            </a:fld>
+            <a:endParaRPr lang="en-US" altLang="en-US"/>
+          </a:p>
+        </p:txBody>
+      </p:sp>
+      <p:sp>
+        <p:nvSpPr>
+          <p:cNvPr id="7" name="TextBox 6"/>
+          <p:cNvSpPr txBox="1"/>
+          <p:nvPr/>
+        </p:nvSpPr>
         <p:spPr>
+          <a:xfrm>
+            <a:off x="1219200" y="4953000"/>
+            <a:ext cx="6477000" cy="461665"/>
+          </a:xfrm>
+          <a:prstGeom prst="rect">
+            <a:avLst/>
+          </a:prstGeom>
           <a:noFill/>
-          <a:ln/>
+        </p:spPr>
+        <p:txBody>
+          <a:bodyPr wrap="square" rtlCol="0">
+            <a:spAutoFit/>
+          </a:bodyPr>
+          <a:lstStyle/>
+          <a:p>
+            <a:pPr algn="ctr"/>
+            <a:r>
+              <a:rPr lang="en-US" b="1" dirty="0" smtClean="0">
+                <a:sym typeface="Wingdings"/>
+              </a:rPr>
+              <a:t></a:t>
+            </a:r>
+            <a:r>
+              <a:rPr lang="en-US" b="1" dirty="0" smtClean="0"/>
+              <a:t> And how can you tell? </a:t>
+            </a:r>
+            <a:r>
+              <a:rPr lang="en-US" b="1" dirty="0" smtClean="0">
+                <a:sym typeface="Wingdings"/>
+              </a:rPr>
+              <a:t></a:t>
+            </a:r>
+            <a:endParaRPr lang="en-US" b="1" dirty="0"/>
+          </a:p>
+        </p:txBody>
+      </p:sp>
+    </p:spTree>
+    <p:extLst>
+      <p:ext uri="{BB962C8B-B14F-4D97-AF65-F5344CB8AC3E}">
+        <p14:creationId xmlns:p14="http://schemas.microsoft.com/office/powerpoint/2010/main" val="584607435"/>
+      </p:ext>
+    </p:extLst>
+  </p:cSld>
+  <p:clrMapOvr>
+    <a:masterClrMapping/>
+  </p:clrMapOvr>
+</p:sld>
+</file>
+
+<file path=ppt/slides/slide3.xml><?xml version="1.0" encoding="utf-8"?>
+<p:sld xmlns:a="http://schemas.openxmlformats.org/drawingml/2006/main" xmlns:r="http://schemas.openxmlformats.org/officeDocument/2006/relationships" xmlns:p="http://schemas.openxmlformats.org/presentationml/2006/main">
+  <p:cSld>
+    <p:spTree>
+      <p:nvGrpSpPr>
+        <p:cNvPr id="1" name=""/>
+        <p:cNvGrpSpPr/>
+        <p:nvPr/>
+      </p:nvGrpSpPr>
+      <p:grpSpPr>
+        <a:xfrm>
+          <a:off x="0" y="0"/>
+          <a:ext cx="0" cy="0"/>
+          <a:chOff x="0" y="0"/>
+          <a:chExt cx="0" cy="0"/>
+        </a:xfrm>
+      </p:grpSpPr>
+      <p:sp>
+        <p:nvSpPr>
+          <p:cNvPr id="2" name="Title 1"/>
+          <p:cNvSpPr>
+            <a:spLocks noGrp="1"/>
+          </p:cNvSpPr>
+          <p:nvPr>
+            <p:ph type="title"/>
+          </p:nvPr>
+        </p:nvSpPr>
+        <p:spPr>
+          <a:xfrm>
+            <a:off x="228600" y="533400"/>
+            <a:ext cx="8305800" cy="685800"/>
+          </a:xfrm>
+        </p:spPr>
+        <p:txBody>
+          <a:bodyPr/>
+          <a:lstStyle/>
+          <a:p>
+            <a:r>
+              <a:rPr lang="en-US" dirty="0" smtClean="0"/>
+              <a:t>Motivation: Big Picture</a:t>
+            </a:r>
+            <a:endParaRPr lang="en-US" dirty="0"/>
+          </a:p>
+        </p:txBody>
+      </p:sp>
+      <p:sp>
+        <p:nvSpPr>
+          <p:cNvPr id="3" name="Content Placeholder 2"/>
+          <p:cNvSpPr>
+            <a:spLocks noGrp="1"/>
+          </p:cNvSpPr>
+          <p:nvPr>
+            <p:ph idx="1"/>
+          </p:nvPr>
+        </p:nvSpPr>
+        <p:spPr>
+          <a:xfrm>
+            <a:off x="5181600" y="1447800"/>
+            <a:ext cx="3733800" cy="5257800"/>
+          </a:xfrm>
+        </p:spPr>
+        <p:txBody>
+          <a:bodyPr/>
+          <a:lstStyle/>
+          <a:p>
+            <a:r>
+              <a:rPr lang="en-US" b="1" dirty="0" smtClean="0"/>
+              <a:t>Hidden Hearing Loss</a:t>
+            </a:r>
+            <a:r>
+              <a:rPr lang="en-US" dirty="0" smtClean="0"/>
+              <a:t> is not diagnosed by standard audiometric threshold testing</a:t>
+            </a:r>
+          </a:p>
+          <a:p>
+            <a:r>
+              <a:rPr lang="en-US" dirty="0" smtClean="0"/>
+              <a:t>Audiometry tests for </a:t>
+            </a:r>
+            <a:r>
+              <a:rPr lang="en-US" b="1" dirty="0" smtClean="0"/>
+              <a:t>detection</a:t>
+            </a:r>
+            <a:r>
+              <a:rPr lang="en-US" dirty="0" smtClean="0"/>
+              <a:t>, not </a:t>
+            </a:r>
+            <a:r>
+              <a:rPr lang="en-US" b="1" dirty="0" smtClean="0"/>
+              <a:t>discrimination</a:t>
+            </a:r>
+            <a:r>
+              <a:rPr lang="en-US" dirty="0" smtClean="0"/>
+              <a:t>.</a:t>
+            </a:r>
+          </a:p>
+          <a:p>
+            <a:pPr lvl="1"/>
+            <a:r>
+              <a:rPr lang="en-US" dirty="0" smtClean="0"/>
+              <a:t>NHT performance differences</a:t>
+            </a:r>
+          </a:p>
+          <a:p>
+            <a:r>
+              <a:rPr lang="en-US" dirty="0" smtClean="0"/>
+              <a:t>Mechanism(s) of HHL currently under debate; </a:t>
+            </a:r>
+            <a:r>
+              <a:rPr lang="en-US" dirty="0" smtClean="0">
+                <a:sym typeface="Wingdings" panose="05000000000000000000" pitchFamily="2" charset="2"/>
+              </a:rPr>
+              <a:t> </a:t>
+            </a:r>
+          </a:p>
+          <a:p>
+            <a:pPr lvl="1"/>
+            <a:r>
+              <a:rPr lang="en-US" dirty="0" smtClean="0"/>
+              <a:t>No objective diagnostics for loss of discrimination currently exist</a:t>
+            </a:r>
+          </a:p>
+        </p:txBody>
+      </p:sp>
+      <p:sp>
+        <p:nvSpPr>
+          <p:cNvPr id="4" name="Footer Placeholder 3"/>
+          <p:cNvSpPr>
+            <a:spLocks noGrp="1"/>
+          </p:cNvSpPr>
+          <p:nvPr>
+            <p:ph type="ftr" sz="quarter" idx="10"/>
+          </p:nvPr>
+        </p:nvSpPr>
+        <p:spPr/>
+        <p:txBody>
+          <a:bodyPr/>
+          <a:lstStyle/>
+          <a:p>
+            <a:pPr>
+              <a:defRPr/>
+            </a:pPr>
+            <a:r>
+              <a:rPr lang="en-US" altLang="en-US" smtClean="0"/>
+              <a:t>Modeling the Effects of Auditory Neuropathy on the ABR</a:t>
+            </a:r>
+            <a:endParaRPr lang="en-US" altLang="en-US" dirty="0"/>
+          </a:p>
+        </p:txBody>
+      </p:sp>
+      <p:sp>
+        <p:nvSpPr>
+          <p:cNvPr id="5" name="Slide Number Placeholder 4"/>
+          <p:cNvSpPr>
+            <a:spLocks noGrp="1"/>
+          </p:cNvSpPr>
+          <p:nvPr>
+            <p:ph type="sldNum" sz="quarter" idx="11"/>
+          </p:nvPr>
+        </p:nvSpPr>
+        <p:spPr/>
+        <p:txBody>
+          <a:bodyPr/>
+          <a:lstStyle/>
+          <a:p>
+            <a:pPr>
+              <a:defRPr/>
+            </a:pPr>
+            <a:fld id="{8840E231-D218-4982-B1DE-6520F190699A}" type="slidenum">
+              <a:rPr lang="en-US" altLang="en-US" smtClean="0"/>
+              <a:pPr>
+                <a:defRPr/>
+              </a:pPr>
+              <a:t>3</a:t>
+            </a:fld>
+            <a:endParaRPr lang="en-US" altLang="en-US" dirty="0"/>
+          </a:p>
+        </p:txBody>
+      </p:sp>
+      <p:sp>
+        <p:nvSpPr>
+          <p:cNvPr id="6" name="Date Placeholder 5"/>
+          <p:cNvSpPr>
+            <a:spLocks noGrp="1"/>
+          </p:cNvSpPr>
+          <p:nvPr>
+            <p:ph type="dt" sz="half" idx="12"/>
+          </p:nvPr>
+        </p:nvSpPr>
+        <p:spPr/>
+        <p:txBody>
+          <a:bodyPr/>
+          <a:lstStyle/>
+          <a:p>
+            <a:pPr>
+              <a:defRPr/>
+            </a:pPr>
+            <a:fld id="{A544915F-7309-4744-8FAD-0D6B1CB5A275}" type="datetime1">
+              <a:rPr lang="en-US" altLang="en-US" smtClean="0"/>
+              <a:t>8/9/16</a:t>
+            </a:fld>
+            <a:endParaRPr lang="en-US" altLang="en-US"/>
+          </a:p>
+        </p:txBody>
+      </p:sp>
+      <p:grpSp>
+        <p:nvGrpSpPr>
+          <p:cNvPr id="9" name="Group 8"/>
+          <p:cNvGrpSpPr/>
+          <p:nvPr/>
+        </p:nvGrpSpPr>
+        <p:grpSpPr>
+          <a:xfrm>
+            <a:off x="337891" y="1447800"/>
+            <a:ext cx="4576655" cy="1600200"/>
+            <a:chOff x="653638" y="1447800"/>
+            <a:chExt cx="3486975" cy="1219200"/>
+          </a:xfrm>
+        </p:grpSpPr>
+        <p:pic>
+          <p:nvPicPr>
+            <p:cNvPr id="7" name="Picture 2" descr="C:\Users\Graham Voysey\Desktop\IMG_6002.JPG"/>
+            <p:cNvPicPr>
+              <a:picLocks noChangeAspect="1" noChangeArrowheads="1"/>
+            </p:cNvPicPr>
+            <p:nvPr/>
+          </p:nvPicPr>
+          <p:blipFill>
+            <a:blip r:embed="rId2" cstate="print">
+              <a:extLst>
+                <a:ext uri="{28A0092B-C50C-407E-A947-70E740481C1C}">
+                  <a14:useLocalDpi xmlns:a14="http://schemas.microsoft.com/office/drawing/2010/main" val="0"/>
+                </a:ext>
+              </a:extLst>
+            </a:blip>
+            <a:srcRect/>
+            <a:stretch>
+              <a:fillRect/>
+            </a:stretch>
+          </p:blipFill>
+          <p:spPr bwMode="auto">
+            <a:xfrm>
+              <a:off x="2514600" y="1447800"/>
+              <a:ext cx="1626013" cy="1219200"/>
+            </a:xfrm>
+            <a:prstGeom prst="rect">
+              <a:avLst/>
+            </a:prstGeom>
+            <a:noFill/>
+            <a:extLst>
+              <a:ext uri="{909E8E84-426E-40dd-AFC4-6F175D3DCCD1}">
+                <a14:hiddenFill xmlns:a14="http://schemas.microsoft.com/office/drawing/2010/main">
+                  <a:solidFill>
+                    <a:srgbClr val="FFFFFF"/>
+                  </a:solidFill>
+                </a14:hiddenFill>
+              </a:ext>
+            </a:extLst>
+          </p:spPr>
+        </p:pic>
+        <p:pic>
+          <p:nvPicPr>
+            <p:cNvPr id="8" name="Picture 3" descr="C:\Users\Graham Voysey\Desktop\IMG_6002-blurred.JPG"/>
+            <p:cNvPicPr>
+              <a:picLocks noChangeAspect="1" noChangeArrowheads="1"/>
+            </p:cNvPicPr>
+            <p:nvPr/>
+          </p:nvPicPr>
+          <p:blipFill>
+            <a:blip r:embed="rId3" cstate="print">
+              <a:extLst>
+                <a:ext uri="{28A0092B-C50C-407E-A947-70E740481C1C}">
+                  <a14:useLocalDpi xmlns:a14="http://schemas.microsoft.com/office/drawing/2010/main" val="0"/>
+                </a:ext>
+              </a:extLst>
+            </a:blip>
+            <a:srcRect/>
+            <a:stretch>
+              <a:fillRect/>
+            </a:stretch>
+          </p:blipFill>
+          <p:spPr bwMode="auto">
+            <a:xfrm>
+              <a:off x="653638" y="1447800"/>
+              <a:ext cx="1626012" cy="1219200"/>
+            </a:xfrm>
+            <a:prstGeom prst="rect">
+              <a:avLst/>
+            </a:prstGeom>
+            <a:noFill/>
+            <a:extLst>
+              <a:ext uri="{909E8E84-426E-40dd-AFC4-6F175D3DCCD1}">
+                <a14:hiddenFill xmlns:a14="http://schemas.microsoft.com/office/drawing/2010/main">
+                  <a:solidFill>
+                    <a:srgbClr val="FFFFFF"/>
+                  </a:solidFill>
+                </a14:hiddenFill>
+              </a:ext>
+            </a:extLst>
+          </p:spPr>
+        </p:pic>
+      </p:grpSp>
+      <p:pic>
+        <p:nvPicPr>
+          <p:cNvPr id="3074" name="Picture 2" descr="C:\Users\Graham Voysey\Google Drive\photos\IMG_0093.GIF"/>
+          <p:cNvPicPr>
+            <a:picLocks noChangeAspect="1" noChangeArrowheads="1" noCrop="1"/>
+          </p:cNvPicPr>
+          <p:nvPr/>
+        </p:nvPicPr>
+        <p:blipFill>
+          <a:blip r:embed="rId4">
+            <a:extLst>
+              <a:ext uri="{28A0092B-C50C-407E-A947-70E740481C1C}">
+                <a14:useLocalDpi xmlns:a14="http://schemas.microsoft.com/office/drawing/2010/main" val="0"/>
+              </a:ext>
+            </a:extLst>
+          </a:blip>
+          <a:srcRect/>
+          <a:stretch>
+            <a:fillRect/>
+          </a:stretch>
+        </p:blipFill>
+        <p:spPr bwMode="auto">
+          <a:xfrm>
+            <a:off x="337891" y="3251985"/>
+            <a:ext cx="4576656" cy="2937777"/>
+          </a:xfrm>
+          <a:prstGeom prst="rect">
+            <a:avLst/>
+          </a:prstGeom>
+          <a:noFill/>
           <a:extLst>
-            <a:ext uri="{909E8E84-426E-40DD-AFC4-6F175D3DCCD1}">
+            <a:ext uri="{909E8E84-426E-40dd-AFC4-6F175D3DCCD1}">
               <a14:hiddenFill xmlns:a14="http://schemas.microsoft.com/office/drawing/2010/main">
                 <a:solidFill>
                   <a:srgbClr val="FFFFFF"/>
                 </a:solidFill>
               </a14:hiddenFill>
             </a:ext>
-            <a:ext uri="{91240B29-F687-4F45-9708-019B960494DF}">
+          </a:extLst>
+        </p:spPr>
+      </p:pic>
+    </p:spTree>
+    <p:extLst>
+      <p:ext uri="{BB962C8B-B14F-4D97-AF65-F5344CB8AC3E}">
+        <p14:creationId xmlns:p14="http://schemas.microsoft.com/office/powerpoint/2010/main" val="1547040722"/>
+      </p:ext>
+    </p:extLst>
+  </p:cSld>
+  <p:clrMapOvr>
+    <a:masterClrMapping/>
+  </p:clrMapOvr>
+  <p:timing>
+    <p:tnLst>
+      <p:par>
+        <p:cTn xmlns:p14="http://schemas.microsoft.com/office/powerpoint/2010/main" id="1" dur="indefinite" restart="never" nodeType="tmRoot"/>
+      </p:par>
+    </p:tnLst>
+  </p:timing>
+</p:sld>
+</file>
+
+<file path=ppt/slides/slide4.xml><?xml version="1.0" encoding="utf-8"?>
+<p:sld xmlns:a="http://schemas.openxmlformats.org/drawingml/2006/main" xmlns:r="http://schemas.openxmlformats.org/officeDocument/2006/relationships" xmlns:p="http://schemas.openxmlformats.org/presentationml/2006/main">
+  <p:cSld>
+    <p:spTree>
+      <p:nvGrpSpPr>
+        <p:cNvPr id="1" name=""/>
+        <p:cNvGrpSpPr/>
+        <p:nvPr/>
+      </p:nvGrpSpPr>
+      <p:grpSpPr>
+        <a:xfrm>
+          <a:off x="0" y="0"/>
+          <a:ext cx="0" cy="0"/>
+          <a:chOff x="0" y="0"/>
+          <a:chExt cx="0" cy="0"/>
+        </a:xfrm>
+      </p:grpSpPr>
+      <p:sp>
+        <p:nvSpPr>
+          <p:cNvPr id="2" name="Title 1"/>
+          <p:cNvSpPr>
+            <a:spLocks noGrp="1"/>
+          </p:cNvSpPr>
+          <p:nvPr>
+            <p:ph type="title"/>
+          </p:nvPr>
+        </p:nvSpPr>
+        <p:spPr/>
+        <p:txBody>
+          <a:bodyPr/>
+          <a:lstStyle/>
+          <a:p>
+            <a:r>
+              <a:rPr lang="en-US" dirty="0" smtClean="0"/>
+              <a:t>Probable Causes of HHL</a:t>
+            </a:r>
+            <a:endParaRPr lang="en-US" dirty="0"/>
+          </a:p>
+        </p:txBody>
+      </p:sp>
+      <p:sp>
+        <p:nvSpPr>
+          <p:cNvPr id="3" name="Content Placeholder 2"/>
+          <p:cNvSpPr>
+            <a:spLocks noGrp="1"/>
+          </p:cNvSpPr>
+          <p:nvPr>
+            <p:ph idx="1"/>
+          </p:nvPr>
+        </p:nvSpPr>
+        <p:spPr/>
+        <p:txBody>
+          <a:bodyPr/>
+          <a:lstStyle/>
+          <a:p>
+            <a:r>
+              <a:rPr lang="en-US" b="1" dirty="0" smtClean="0"/>
+              <a:t>Central Processing Disorder</a:t>
+            </a:r>
+            <a:r>
+              <a:rPr lang="en-US" dirty="0" smtClean="0"/>
+              <a:t>: A polite way of saying “We have no idea. Your ear seems fine; maybe it’s all in your head”</a:t>
+            </a:r>
+          </a:p>
+          <a:p>
+            <a:pPr lvl="1"/>
+            <a:r>
+              <a:rPr lang="en-US" i="1" dirty="0" smtClean="0"/>
+              <a:t>Sometimes, deficits or disorders actually are central (e.g., tinnitus)</a:t>
+            </a:r>
+          </a:p>
+          <a:p>
+            <a:endParaRPr lang="en-US" dirty="0" smtClean="0"/>
+          </a:p>
+          <a:p>
+            <a:r>
+              <a:rPr lang="en-US" b="1" dirty="0" smtClean="0"/>
+              <a:t>Auditory Neuropathy (Cochlear </a:t>
+            </a:r>
+            <a:r>
+              <a:rPr lang="en-US" b="1" dirty="0" err="1" smtClean="0"/>
+              <a:t>Synaptopathy</a:t>
+            </a:r>
+            <a:r>
+              <a:rPr lang="en-US" b="1" dirty="0" smtClean="0"/>
+              <a:t>)</a:t>
+            </a:r>
+            <a:r>
+              <a:rPr lang="en-US" dirty="0" smtClean="0"/>
+              <a:t>:</a:t>
+            </a:r>
+          </a:p>
+          <a:p>
+            <a:pPr lvl="1"/>
+            <a:r>
+              <a:rPr lang="en-US" dirty="0" smtClean="0"/>
+              <a:t>What would peripheral damage that </a:t>
+            </a:r>
+            <a:r>
+              <a:rPr lang="en-US" b="1" dirty="0" smtClean="0"/>
+              <a:t>does not </a:t>
+            </a:r>
+            <a:r>
+              <a:rPr lang="en-US" dirty="0" smtClean="0"/>
+              <a:t>affect thresholds or middle ear mechanics, but </a:t>
+            </a:r>
+            <a:r>
+              <a:rPr lang="en-US" b="1" dirty="0" smtClean="0"/>
+              <a:t>does</a:t>
+            </a:r>
+            <a:r>
+              <a:rPr lang="en-US" dirty="0" smtClean="0"/>
+              <a:t> affect the fidelity of the transmission of sound from the ear to higher areas look like? </a:t>
+            </a:r>
+          </a:p>
+          <a:p>
+            <a:pPr lvl="2"/>
+            <a:r>
+              <a:rPr lang="en-US" dirty="0" smtClean="0"/>
+              <a:t>And, where would it happen?</a:t>
+            </a:r>
+          </a:p>
+          <a:p>
+            <a:pPr lvl="1"/>
+            <a:r>
+              <a:rPr lang="en-US" dirty="0" smtClean="0"/>
+              <a:t>Auditory Nerve is a good place to start looking.</a:t>
+            </a:r>
+          </a:p>
+        </p:txBody>
+      </p:sp>
+      <p:sp>
+        <p:nvSpPr>
+          <p:cNvPr id="4" name="Footer Placeholder 3"/>
+          <p:cNvSpPr>
+            <a:spLocks noGrp="1"/>
+          </p:cNvSpPr>
+          <p:nvPr>
+            <p:ph type="ftr" sz="quarter" idx="10"/>
+          </p:nvPr>
+        </p:nvSpPr>
+        <p:spPr/>
+        <p:txBody>
+          <a:bodyPr/>
+          <a:lstStyle/>
+          <a:p>
+            <a:pPr>
+              <a:defRPr/>
+            </a:pPr>
+            <a:r>
+              <a:rPr lang="en-US" altLang="en-US" smtClean="0"/>
+              <a:t>Modeling the Effects of Auditory Neuropathy on the ABR</a:t>
+            </a:r>
+            <a:endParaRPr lang="en-US" altLang="en-US" dirty="0"/>
+          </a:p>
+        </p:txBody>
+      </p:sp>
+      <p:sp>
+        <p:nvSpPr>
+          <p:cNvPr id="5" name="Slide Number Placeholder 4"/>
+          <p:cNvSpPr>
+            <a:spLocks noGrp="1"/>
+          </p:cNvSpPr>
+          <p:nvPr>
+            <p:ph type="sldNum" sz="quarter" idx="11"/>
+          </p:nvPr>
+        </p:nvSpPr>
+        <p:spPr/>
+        <p:txBody>
+          <a:bodyPr/>
+          <a:lstStyle/>
+          <a:p>
+            <a:pPr>
+              <a:defRPr/>
+            </a:pPr>
+            <a:fld id="{8840E231-D218-4982-B1DE-6520F190699A}" type="slidenum">
+              <a:rPr lang="en-US" altLang="en-US" smtClean="0"/>
+              <a:pPr>
+                <a:defRPr/>
+              </a:pPr>
+              <a:t>4</a:t>
+            </a:fld>
+            <a:endParaRPr lang="en-US" altLang="en-US" dirty="0"/>
+          </a:p>
+        </p:txBody>
+      </p:sp>
+      <p:sp>
+        <p:nvSpPr>
+          <p:cNvPr id="6" name="Date Placeholder 5"/>
+          <p:cNvSpPr>
+            <a:spLocks noGrp="1"/>
+          </p:cNvSpPr>
+          <p:nvPr>
+            <p:ph type="dt" sz="half" idx="12"/>
+          </p:nvPr>
+        </p:nvSpPr>
+        <p:spPr/>
+        <p:txBody>
+          <a:bodyPr/>
+          <a:lstStyle/>
+          <a:p>
+            <a:pPr>
+              <a:defRPr/>
+            </a:pPr>
+            <a:fld id="{A544915F-7309-4744-8FAD-0D6B1CB5A275}" type="datetime1">
+              <a:rPr lang="en-US" altLang="en-US" smtClean="0"/>
+              <a:t>8/9/16</a:t>
+            </a:fld>
+            <a:endParaRPr lang="en-US" altLang="en-US"/>
+          </a:p>
+        </p:txBody>
+      </p:sp>
+    </p:spTree>
+    <p:extLst>
+      <p:ext uri="{BB962C8B-B14F-4D97-AF65-F5344CB8AC3E}">
+        <p14:creationId xmlns:p14="http://schemas.microsoft.com/office/powerpoint/2010/main" val="1014089366"/>
+      </p:ext>
+    </p:extLst>
+  </p:cSld>
+  <p:clrMapOvr>
+    <a:masterClrMapping/>
+  </p:clrMapOvr>
+  <p:timing>
+    <p:tnLst>
+      <p:par>
+        <p:cTn xmlns:p14="http://schemas.microsoft.com/office/powerpoint/2010/main" id="1" dur="indefinite" restart="never" nodeType="tmRoot"/>
+      </p:par>
+    </p:tnLst>
+  </p:timing>
+</p:sld>
+</file>
+
+<file path=ppt/slides/slide5.xml><?xml version="1.0" encoding="utf-8"?>
+<p:sld xmlns:a="http://schemas.openxmlformats.org/drawingml/2006/main" xmlns:r="http://schemas.openxmlformats.org/officeDocument/2006/relationships" xmlns:p="http://schemas.openxmlformats.org/presentationml/2006/main">
+  <p:cSld>
+    <p:spTree>
+      <p:nvGrpSpPr>
+        <p:cNvPr id="1" name=""/>
+        <p:cNvGrpSpPr/>
+        <p:nvPr/>
+      </p:nvGrpSpPr>
+      <p:grpSpPr>
+        <a:xfrm>
+          <a:off x="0" y="0"/>
+          <a:ext cx="0" cy="0"/>
+          <a:chOff x="0" y="0"/>
+          <a:chExt cx="0" cy="0"/>
+        </a:xfrm>
+      </p:grpSpPr>
+      <p:sp>
+        <p:nvSpPr>
+          <p:cNvPr id="2" name="Title 1"/>
+          <p:cNvSpPr>
+            <a:spLocks noGrp="1"/>
+          </p:cNvSpPr>
+          <p:nvPr>
+            <p:ph type="title"/>
+          </p:nvPr>
+        </p:nvSpPr>
+        <p:spPr/>
+        <p:txBody>
+          <a:bodyPr/>
+          <a:lstStyle/>
+          <a:p>
+            <a:pPr algn="ctr"/>
+            <a:r>
+              <a:rPr lang="en-US" dirty="0" smtClean="0"/>
+              <a:t>Acknowledgements</a:t>
+            </a:r>
+            <a:endParaRPr lang="en-US" dirty="0"/>
+          </a:p>
+        </p:txBody>
+      </p:sp>
+      <p:sp>
+        <p:nvSpPr>
+          <p:cNvPr id="3" name="Content Placeholder 2"/>
+          <p:cNvSpPr>
+            <a:spLocks noGrp="1"/>
+          </p:cNvSpPr>
+          <p:nvPr>
+            <p:ph idx="1"/>
+          </p:nvPr>
+        </p:nvSpPr>
+        <p:spPr>
+          <a:xfrm>
+            <a:off x="609600" y="2971800"/>
+            <a:ext cx="3886200" cy="1828800"/>
+          </a:xfrm>
+        </p:spPr>
+        <p:txBody>
+          <a:bodyPr/>
+          <a:lstStyle/>
+          <a:p>
+            <a:pPr marL="0" indent="0">
+              <a:buNone/>
+            </a:pPr>
+            <a:r>
+              <a:rPr lang="en-US" sz="2200" b="1" dirty="0" smtClean="0"/>
+              <a:t>Auditory Biophysics Lab</a:t>
+            </a:r>
+          </a:p>
+          <a:p>
+            <a:r>
+              <a:rPr lang="en-US" sz="2000" dirty="0" smtClean="0"/>
+              <a:t>Dave Mountain</a:t>
+            </a:r>
+          </a:p>
+          <a:p>
+            <a:r>
+              <a:rPr lang="en-US" sz="2000" dirty="0" smtClean="0"/>
+              <a:t>Dave Anderson</a:t>
+            </a:r>
+          </a:p>
+          <a:p>
+            <a:r>
+              <a:rPr lang="en-US" sz="2000" dirty="0" err="1" smtClean="0"/>
+              <a:t>Aleks</a:t>
+            </a:r>
+            <a:r>
+              <a:rPr lang="en-US" sz="2000" dirty="0" smtClean="0"/>
+              <a:t> </a:t>
+            </a:r>
+            <a:r>
+              <a:rPr lang="en-US" sz="2000" dirty="0" err="1" smtClean="0"/>
+              <a:t>Zosuls</a:t>
+            </a:r>
+            <a:endParaRPr lang="en-US" sz="2000" dirty="0" smtClean="0"/>
+          </a:p>
+          <a:p>
+            <a:r>
+              <a:rPr lang="en-US" sz="2000" dirty="0" smtClean="0"/>
+              <a:t>Andy </a:t>
+            </a:r>
+            <a:r>
+              <a:rPr lang="en-US" sz="2000" dirty="0" err="1" smtClean="0"/>
+              <a:t>Brughera</a:t>
+            </a:r>
+            <a:endParaRPr lang="en-US" sz="2000" dirty="0" smtClean="0"/>
+          </a:p>
+        </p:txBody>
+      </p:sp>
+      <p:sp>
+        <p:nvSpPr>
+          <p:cNvPr id="4" name="Footer Placeholder 3"/>
+          <p:cNvSpPr>
+            <a:spLocks noGrp="1"/>
+          </p:cNvSpPr>
+          <p:nvPr>
+            <p:ph type="ftr" sz="quarter" idx="10"/>
+          </p:nvPr>
+        </p:nvSpPr>
+        <p:spPr/>
+        <p:txBody>
+          <a:bodyPr/>
+          <a:lstStyle/>
+          <a:p>
+            <a:pPr>
+              <a:defRPr/>
+            </a:pPr>
+            <a:r>
+              <a:rPr lang="en-US" altLang="en-US" smtClean="0"/>
+              <a:t>Presentation Title</a:t>
+            </a:r>
+            <a:endParaRPr lang="en-US" altLang="en-US"/>
+          </a:p>
+        </p:txBody>
+      </p:sp>
+      <p:sp>
+        <p:nvSpPr>
+          <p:cNvPr id="5" name="Slide Number Placeholder 4"/>
+          <p:cNvSpPr>
+            <a:spLocks noGrp="1"/>
+          </p:cNvSpPr>
+          <p:nvPr>
+            <p:ph type="sldNum" sz="quarter" idx="11"/>
+          </p:nvPr>
+        </p:nvSpPr>
+        <p:spPr/>
+        <p:txBody>
+          <a:bodyPr/>
+          <a:lstStyle/>
+          <a:p>
+            <a:pPr>
+              <a:defRPr/>
+            </a:pPr>
+            <a:fld id="{8840E231-D218-4982-B1DE-6520F190699A}" type="slidenum">
+              <a:rPr lang="en-US" altLang="en-US" smtClean="0"/>
+              <a:pPr>
+                <a:defRPr/>
+              </a:pPr>
+              <a:t>5</a:t>
+            </a:fld>
+            <a:endParaRPr lang="en-US" altLang="en-US" dirty="0"/>
+          </a:p>
+        </p:txBody>
+      </p:sp>
+      <p:sp>
+        <p:nvSpPr>
+          <p:cNvPr id="6" name="Date Placeholder 5"/>
+          <p:cNvSpPr>
+            <a:spLocks noGrp="1"/>
+          </p:cNvSpPr>
+          <p:nvPr>
+            <p:ph type="dt" sz="half" idx="12"/>
+          </p:nvPr>
+        </p:nvSpPr>
+        <p:spPr/>
+        <p:txBody>
+          <a:bodyPr/>
+          <a:lstStyle/>
+          <a:p>
+            <a:pPr>
+              <a:defRPr/>
+            </a:pPr>
+            <a:fld id="{A544915F-7309-4744-8FAD-0D6B1CB5A275}" type="datetime1">
+              <a:rPr lang="en-US" altLang="en-US" smtClean="0"/>
+              <a:t>8/9/16</a:t>
+            </a:fld>
+            <a:endParaRPr lang="en-US" altLang="en-US"/>
+          </a:p>
+        </p:txBody>
+      </p:sp>
+      <p:sp>
+        <p:nvSpPr>
+          <p:cNvPr id="7" name="Content Placeholder 2"/>
+          <p:cNvSpPr txBox="1">
+            <a:spLocks/>
+          </p:cNvSpPr>
+          <p:nvPr/>
+        </p:nvSpPr>
+        <p:spPr bwMode="auto">
+          <a:xfrm>
+            <a:off x="609600" y="4876800"/>
+            <a:ext cx="4191000" cy="1219200"/>
+          </a:xfrm>
+          <a:prstGeom prst="rect">
+            <a:avLst/>
+          </a:prstGeom>
+          <a:noFill/>
+          <a:ln>
+            <a:noFill/>
+          </a:ln>
+          <a:extLst>
+            <a:ext uri="{909E8E84-426E-40dd-AFC4-6F175D3DCCD1}">
+              <a14:hiddenFill xmlns:a14="http://schemas.microsoft.com/office/drawing/2010/main">
+                <a:solidFill>
+                  <a:srgbClr val="FFFFFF"/>
+                </a:solidFill>
+              </a14:hiddenFill>
+            </a:ext>
+            <a:ext uri="{91240B29-F687-4f45-9708-019B960494DF}">
               <a14:hiddenLine xmlns:a14="http://schemas.microsoft.com/office/drawing/2010/main" w="9525">
                 <a:solidFill>
                   <a:srgbClr val="000000"/>
@@ -5482,155 +6576,270 @@
           </a:extLst>
         </p:spPr>
         <p:txBody>
-          <a:bodyPr/>
+          <a:bodyPr vert="horz" wrap="square" lIns="91440" tIns="45720" rIns="91440" bIns="45720" numCol="1" anchor="t" anchorCtr="0" compatLnSpc="1">
+            <a:prstTxWarp prst="textNoShape">
+              <a:avLst/>
+            </a:prstTxWarp>
+          </a:bodyPr>
           <a:lstStyle>
-            <a:lvl1pPr>
-              <a:defRPr sz="2400">
-                <a:solidFill>
-                  <a:schemeClr val="tx1"/>
-                </a:solidFill>
-                <a:latin typeface="Times" charset="0"/>
-                <a:ea typeface="Osaka" charset="-128"/>
-              </a:defRPr>
-            </a:lvl1pPr>
-            <a:lvl2pPr marL="37931725" indent="-37474525">
-              <a:defRPr sz="2400">
-                <a:solidFill>
-                  <a:schemeClr val="tx1"/>
-                </a:solidFill>
-                <a:latin typeface="Times" charset="0"/>
-                <a:ea typeface="Osaka" charset="-128"/>
-              </a:defRPr>
-            </a:lvl2pPr>
-            <a:lvl3pPr marL="1143000" indent="-228600">
-              <a:defRPr sz="2400">
-                <a:solidFill>
-                  <a:schemeClr val="tx1"/>
-                </a:solidFill>
-                <a:latin typeface="Times" charset="0"/>
-                <a:ea typeface="Osaka" charset="-128"/>
-              </a:defRPr>
-            </a:lvl3pPr>
-            <a:lvl4pPr marL="1600200" indent="-228600">
-              <a:defRPr sz="2400">
-                <a:solidFill>
-                  <a:schemeClr val="tx1"/>
-                </a:solidFill>
-                <a:latin typeface="Times" charset="0"/>
-                <a:ea typeface="Osaka" charset="-128"/>
-              </a:defRPr>
-            </a:lvl4pPr>
-            <a:lvl5pPr marL="2057400" indent="-228600">
-              <a:defRPr sz="2400">
-                <a:solidFill>
-                  <a:schemeClr val="tx1"/>
-                </a:solidFill>
-                <a:latin typeface="Times" charset="0"/>
-                <a:ea typeface="Osaka" charset="-128"/>
-              </a:defRPr>
-            </a:lvl5pPr>
-            <a:lvl6pPr marL="2514600" indent="-228600" eaLnBrk="0" fontAlgn="base" hangingPunct="0">
+            <a:lvl1pPr marL="342900" indent="-342900" algn="l" rtl="0" eaLnBrk="0" fontAlgn="base" hangingPunct="0">
               <a:spcBef>
-                <a:spcPct val="0"/>
+                <a:spcPct val="20000"/>
               </a:spcBef>
               <a:spcAft>
                 <a:spcPct val="0"/>
               </a:spcAft>
+              <a:buClr>
+                <a:srgbClr val="2675B4"/>
+              </a:buClr>
+              <a:buFont typeface="Wingdings" charset="2"/>
+              <a:buChar char="§"/>
               <a:defRPr sz="2400">
                 <a:solidFill>
                   <a:schemeClr val="tx1"/>
                 </a:solidFill>
-                <a:latin typeface="Times" charset="0"/>
-                <a:ea typeface="Osaka" charset="-128"/>
+                <a:latin typeface="+mn-lt"/>
+                <a:ea typeface="+mn-ea"/>
+                <a:cs typeface="+mn-cs"/>
               </a:defRPr>
-            </a:lvl6pPr>
-            <a:lvl7pPr marL="2971800" indent="-228600" eaLnBrk="0" fontAlgn="base" hangingPunct="0">
+            </a:lvl1pPr>
+            <a:lvl2pPr marL="742950" indent="-285750" algn="l" rtl="0" eaLnBrk="0" fontAlgn="base" hangingPunct="0">
               <a:spcBef>
-                <a:spcPct val="0"/>
+                <a:spcPct val="20000"/>
               </a:spcBef>
               <a:spcAft>
                 <a:spcPct val="0"/>
               </a:spcAft>
-              <a:defRPr sz="2400">
+              <a:buClr>
+                <a:srgbClr val="2675B4"/>
+              </a:buClr>
+              <a:buFont typeface="Wingdings" charset="2"/>
+              <a:buChar char="§"/>
+              <a:defRPr>
                 <a:solidFill>
                   <a:schemeClr val="tx1"/>
                 </a:solidFill>
-                <a:latin typeface="Times" charset="0"/>
-                <a:ea typeface="Osaka" charset="-128"/>
+                <a:latin typeface="+mn-lt"/>
+                <a:ea typeface="+mn-ea"/>
+                <a:cs typeface="+mn-cs"/>
               </a:defRPr>
-            </a:lvl7pPr>
-            <a:lvl8pPr marL="3429000" indent="-228600" eaLnBrk="0" fontAlgn="base" hangingPunct="0">
+            </a:lvl2pPr>
+            <a:lvl3pPr marL="1143000" indent="-228600" algn="l" rtl="0" eaLnBrk="0" fontAlgn="base" hangingPunct="0">
               <a:spcBef>
-                <a:spcPct val="0"/>
+                <a:spcPct val="20000"/>
               </a:spcBef>
               <a:spcAft>
                 <a:spcPct val="0"/>
               </a:spcAft>
-              <a:defRPr sz="2400">
+              <a:buClr>
+                <a:srgbClr val="2675B4"/>
+              </a:buClr>
+              <a:buFont typeface="Wingdings" charset="2"/>
+              <a:buChar char="§"/>
+              <a:defRPr>
                 <a:solidFill>
                   <a:schemeClr val="tx1"/>
                 </a:solidFill>
-                <a:latin typeface="Times" charset="0"/>
-                <a:ea typeface="Osaka" charset="-128"/>
+                <a:latin typeface="+mn-lt"/>
+                <a:ea typeface="+mn-ea"/>
+                <a:cs typeface="+mn-cs"/>
               </a:defRPr>
-            </a:lvl8pPr>
-            <a:lvl9pPr marL="3886200" indent="-228600" eaLnBrk="0" fontAlgn="base" hangingPunct="0">
+            </a:lvl3pPr>
+            <a:lvl4pPr marL="1600200" indent="-228600" algn="l" rtl="0" eaLnBrk="0" fontAlgn="base" hangingPunct="0">
               <a:spcBef>
-                <a:spcPct val="0"/>
+                <a:spcPct val="20000"/>
               </a:spcBef>
               <a:spcAft>
                 <a:spcPct val="0"/>
               </a:spcAft>
-              <a:defRPr sz="2400">
+              <a:buClr>
+                <a:srgbClr val="2675B4"/>
+              </a:buClr>
+              <a:buFont typeface="Wingdings" charset="2"/>
+              <a:buChar char="§"/>
+              <a:defRPr>
                 <a:solidFill>
                   <a:schemeClr val="tx1"/>
                 </a:solidFill>
-                <a:latin typeface="Times" charset="0"/>
-                <a:ea typeface="Osaka" charset="-128"/>
+                <a:latin typeface="+mn-lt"/>
+                <a:ea typeface="+mn-ea"/>
+                <a:cs typeface="+mn-cs"/>
+              </a:defRPr>
+            </a:lvl4pPr>
+            <a:lvl5pPr marL="2057400" indent="-228600" algn="l" rtl="0" eaLnBrk="0" fontAlgn="base" hangingPunct="0">
+              <a:spcBef>
+                <a:spcPct val="20000"/>
+              </a:spcBef>
+              <a:spcAft>
+                <a:spcPct val="0"/>
+              </a:spcAft>
+              <a:buClr>
+                <a:srgbClr val="2675B4"/>
+              </a:buClr>
+              <a:buFont typeface="Wingdings" charset="2"/>
+              <a:buChar char="§"/>
+              <a:defRPr>
+                <a:solidFill>
+                  <a:schemeClr val="tx1"/>
+                </a:solidFill>
+                <a:latin typeface="+mn-lt"/>
+                <a:ea typeface="+mn-ea"/>
+                <a:cs typeface="+mn-cs"/>
+              </a:defRPr>
+            </a:lvl5pPr>
+            <a:lvl6pPr marL="2514600" indent="-228600" algn="l" rtl="0" fontAlgn="base">
+              <a:spcBef>
+                <a:spcPct val="20000"/>
+              </a:spcBef>
+              <a:spcAft>
+                <a:spcPct val="0"/>
+              </a:spcAft>
+              <a:buClr>
+                <a:srgbClr val="2675B4"/>
+              </a:buClr>
+              <a:buFont typeface="Wingdings" charset="2"/>
+              <a:buChar char="§"/>
+              <a:defRPr>
+                <a:solidFill>
+                  <a:schemeClr val="tx1"/>
+                </a:solidFill>
+                <a:latin typeface="+mn-lt"/>
+                <a:ea typeface="+mn-ea"/>
+                <a:cs typeface="+mn-cs"/>
+              </a:defRPr>
+            </a:lvl6pPr>
+            <a:lvl7pPr marL="2971800" indent="-228600" algn="l" rtl="0" fontAlgn="base">
+              <a:spcBef>
+                <a:spcPct val="20000"/>
+              </a:spcBef>
+              <a:spcAft>
+                <a:spcPct val="0"/>
+              </a:spcAft>
+              <a:buClr>
+                <a:srgbClr val="2675B4"/>
+              </a:buClr>
+              <a:buFont typeface="Wingdings" charset="2"/>
+              <a:buChar char="§"/>
+              <a:defRPr>
+                <a:solidFill>
+                  <a:schemeClr val="tx1"/>
+                </a:solidFill>
+                <a:latin typeface="+mn-lt"/>
+                <a:ea typeface="+mn-ea"/>
+                <a:cs typeface="+mn-cs"/>
+              </a:defRPr>
+            </a:lvl7pPr>
+            <a:lvl8pPr marL="3429000" indent="-228600" algn="l" rtl="0" fontAlgn="base">
+              <a:spcBef>
+                <a:spcPct val="20000"/>
+              </a:spcBef>
+              <a:spcAft>
+                <a:spcPct val="0"/>
+              </a:spcAft>
+              <a:buClr>
+                <a:srgbClr val="2675B4"/>
+              </a:buClr>
+              <a:buFont typeface="Wingdings" charset="2"/>
+              <a:buChar char="§"/>
+              <a:defRPr>
+                <a:solidFill>
+                  <a:schemeClr val="tx1"/>
+                </a:solidFill>
+                <a:latin typeface="+mn-lt"/>
+                <a:ea typeface="+mn-ea"/>
+                <a:cs typeface="+mn-cs"/>
+              </a:defRPr>
+            </a:lvl8pPr>
+            <a:lvl9pPr marL="3886200" indent="-228600" algn="l" rtl="0" fontAlgn="base">
+              <a:spcBef>
+                <a:spcPct val="20000"/>
+              </a:spcBef>
+              <a:spcAft>
+                <a:spcPct val="0"/>
+              </a:spcAft>
+              <a:buClr>
+                <a:srgbClr val="2675B4"/>
+              </a:buClr>
+              <a:buFont typeface="Wingdings" charset="2"/>
+              <a:buChar char="§"/>
+              <a:defRPr>
+                <a:solidFill>
+                  <a:schemeClr val="tx1"/>
+                </a:solidFill>
+                <a:latin typeface="+mn-lt"/>
+                <a:ea typeface="+mn-ea"/>
+                <a:cs typeface="+mn-cs"/>
               </a:defRPr>
             </a:lvl9pPr>
           </a:lstStyle>
           <a:p>
-            <a:r>
-              <a:rPr lang="en-US" altLang="en-US" sz="1200" smtClean="0">
-                <a:solidFill>
-                  <a:schemeClr val="bg1"/>
-                </a:solidFill>
-                <a:latin typeface="Arial" charset="0"/>
-              </a:rPr>
-              <a:t>Presentation Title</a:t>
-            </a:r>
-            <a:endParaRPr lang="en-US" altLang="en-US" sz="1200">
-              <a:solidFill>
-                <a:schemeClr val="bg1"/>
-              </a:solidFill>
-              <a:latin typeface="Arial" charset="0"/>
-            </a:endParaRPr>
-          </a:p>
-        </p:txBody>
-      </p:sp>
-      <p:sp>
-        <p:nvSpPr>
-          <p:cNvPr id="4099" name="Slide Number Placeholder 4"/>
-          <p:cNvSpPr>
-            <a:spLocks noGrp="1"/>
-          </p:cNvSpPr>
-          <p:nvPr>
-            <p:ph type="sldNum" sz="quarter" idx="11"/>
-          </p:nvPr>
-        </p:nvSpPr>
-        <p:spPr>
+            <a:pPr marL="0" indent="0">
+              <a:buFont typeface="Wingdings" charset="2"/>
+              <a:buNone/>
+            </a:pPr>
+            <a:r>
+              <a:rPr lang="en-US" sz="2200" b="1" dirty="0" smtClean="0"/>
+              <a:t>Auditory Neuroscience Lab</a:t>
+            </a:r>
+          </a:p>
+          <a:p>
+            <a:r>
+              <a:rPr lang="en-US" sz="2000" dirty="0" err="1" smtClean="0"/>
+              <a:t>Goldbarg</a:t>
+            </a:r>
+            <a:r>
+              <a:rPr lang="en-US" sz="2000" dirty="0" smtClean="0"/>
+              <a:t> </a:t>
+            </a:r>
+            <a:r>
+              <a:rPr lang="en-US" sz="2000" dirty="0" err="1" smtClean="0"/>
+              <a:t>Mehraei</a:t>
+            </a:r>
+            <a:endParaRPr lang="en-US" sz="2000" dirty="0" smtClean="0"/>
+          </a:p>
+          <a:p>
+            <a:r>
+              <a:rPr lang="en-US" sz="2000" dirty="0" smtClean="0"/>
+              <a:t>Le Wang</a:t>
+            </a:r>
+          </a:p>
+          <a:p>
+            <a:endParaRPr lang="en-US" dirty="0" smtClean="0"/>
+          </a:p>
+          <a:p>
+            <a:endParaRPr lang="en-US" dirty="0" smtClean="0"/>
+          </a:p>
+        </p:txBody>
+      </p:sp>
+      <p:sp>
+        <p:nvSpPr>
+          <p:cNvPr id="8" name="Content Placeholder 2"/>
+          <p:cNvSpPr txBox="1">
+            <a:spLocks/>
+          </p:cNvSpPr>
+          <p:nvPr/>
+        </p:nvSpPr>
+        <p:spPr bwMode="auto">
+          <a:xfrm>
+            <a:off x="609600" y="1143000"/>
+            <a:ext cx="3352800" cy="1905000"/>
+          </a:xfrm>
+          <a:prstGeom prst="rect">
+            <a:avLst/>
+          </a:prstGeom>
           <a:noFill/>
-          <a:ln/>
+          <a:ln>
+            <a:noFill/>
+          </a:ln>
           <a:extLst>
-            <a:ext uri="{909E8E84-426E-40DD-AFC4-6F175D3DCCD1}">
+            <a:ext uri="{909E8E84-426E-40dd-AFC4-6F175D3DCCD1}">
               <a14:hiddenFill xmlns:a14="http://schemas.microsoft.com/office/drawing/2010/main">
                 <a:solidFill>
                   <a:srgbClr val="FFFFFF"/>
                 </a:solidFill>
               </a14:hiddenFill>
             </a:ext>
-            <a:ext uri="{91240B29-F687-4F45-9708-019B960494DF}">
+            <a:ext uri="{91240B29-F687-4f45-9708-019B960494DF}">
               <a14:hiddenLine xmlns:a14="http://schemas.microsoft.com/office/drawing/2010/main" w="9525">
                 <a:solidFill>
                   <a:srgbClr val="000000"/>
@@ -5643,160 +6852,271 @@
           </a:extLst>
         </p:spPr>
         <p:txBody>
-          <a:bodyPr/>
+          <a:bodyPr vert="horz" wrap="square" lIns="91440" tIns="45720" rIns="91440" bIns="45720" numCol="1" anchor="t" anchorCtr="0" compatLnSpc="1">
+            <a:prstTxWarp prst="textNoShape">
+              <a:avLst/>
+            </a:prstTxWarp>
+          </a:bodyPr>
           <a:lstStyle>
-            <a:lvl1pPr>
-              <a:defRPr sz="2400">
-                <a:solidFill>
-                  <a:schemeClr val="tx1"/>
-                </a:solidFill>
-                <a:latin typeface="Times" charset="0"/>
-                <a:ea typeface="Osaka" charset="-128"/>
-              </a:defRPr>
-            </a:lvl1pPr>
-            <a:lvl2pPr marL="37931725" indent="-37474525">
-              <a:defRPr sz="2400">
-                <a:solidFill>
-                  <a:schemeClr val="tx1"/>
-                </a:solidFill>
-                <a:latin typeface="Times" charset="0"/>
-                <a:ea typeface="Osaka" charset="-128"/>
-              </a:defRPr>
-            </a:lvl2pPr>
-            <a:lvl3pPr marL="1143000" indent="-228600">
-              <a:defRPr sz="2400">
-                <a:solidFill>
-                  <a:schemeClr val="tx1"/>
-                </a:solidFill>
-                <a:latin typeface="Times" charset="0"/>
-                <a:ea typeface="Osaka" charset="-128"/>
-              </a:defRPr>
-            </a:lvl3pPr>
-            <a:lvl4pPr marL="1600200" indent="-228600">
-              <a:defRPr sz="2400">
-                <a:solidFill>
-                  <a:schemeClr val="tx1"/>
-                </a:solidFill>
-                <a:latin typeface="Times" charset="0"/>
-                <a:ea typeface="Osaka" charset="-128"/>
-              </a:defRPr>
-            </a:lvl4pPr>
-            <a:lvl5pPr marL="2057400" indent="-228600">
-              <a:defRPr sz="2400">
-                <a:solidFill>
-                  <a:schemeClr val="tx1"/>
-                </a:solidFill>
-                <a:latin typeface="Times" charset="0"/>
-                <a:ea typeface="Osaka" charset="-128"/>
-              </a:defRPr>
-            </a:lvl5pPr>
-            <a:lvl6pPr marL="2514600" indent="-228600" eaLnBrk="0" fontAlgn="base" hangingPunct="0">
+            <a:lvl1pPr marL="342900" indent="-342900" algn="l" rtl="0" eaLnBrk="0" fontAlgn="base" hangingPunct="0">
               <a:spcBef>
-                <a:spcPct val="0"/>
+                <a:spcPct val="20000"/>
               </a:spcBef>
               <a:spcAft>
                 <a:spcPct val="0"/>
               </a:spcAft>
+              <a:buClr>
+                <a:srgbClr val="2675B4"/>
+              </a:buClr>
+              <a:buFont typeface="Wingdings" charset="2"/>
+              <a:buChar char="§"/>
               <a:defRPr sz="2400">
                 <a:solidFill>
                   <a:schemeClr val="tx1"/>
                 </a:solidFill>
-                <a:latin typeface="Times" charset="0"/>
-                <a:ea typeface="Osaka" charset="-128"/>
+                <a:latin typeface="+mn-lt"/>
+                <a:ea typeface="+mn-ea"/>
+                <a:cs typeface="+mn-cs"/>
               </a:defRPr>
-            </a:lvl6pPr>
-            <a:lvl7pPr marL="2971800" indent="-228600" eaLnBrk="0" fontAlgn="base" hangingPunct="0">
+            </a:lvl1pPr>
+            <a:lvl2pPr marL="742950" indent="-285750" algn="l" rtl="0" eaLnBrk="0" fontAlgn="base" hangingPunct="0">
               <a:spcBef>
-                <a:spcPct val="0"/>
+                <a:spcPct val="20000"/>
               </a:spcBef>
               <a:spcAft>
                 <a:spcPct val="0"/>
               </a:spcAft>
-              <a:defRPr sz="2400">
+              <a:buClr>
+                <a:srgbClr val="2675B4"/>
+              </a:buClr>
+              <a:buFont typeface="Wingdings" charset="2"/>
+              <a:buChar char="§"/>
+              <a:defRPr>
                 <a:solidFill>
                   <a:schemeClr val="tx1"/>
                 </a:solidFill>
-                <a:latin typeface="Times" charset="0"/>
-                <a:ea typeface="Osaka" charset="-128"/>
+                <a:latin typeface="+mn-lt"/>
+                <a:ea typeface="+mn-ea"/>
+                <a:cs typeface="+mn-cs"/>
               </a:defRPr>
-            </a:lvl7pPr>
-            <a:lvl8pPr marL="3429000" indent="-228600" eaLnBrk="0" fontAlgn="base" hangingPunct="0">
+            </a:lvl2pPr>
+            <a:lvl3pPr marL="1143000" indent="-228600" algn="l" rtl="0" eaLnBrk="0" fontAlgn="base" hangingPunct="0">
               <a:spcBef>
-                <a:spcPct val="0"/>
+                <a:spcPct val="20000"/>
               </a:spcBef>
               <a:spcAft>
                 <a:spcPct val="0"/>
               </a:spcAft>
-              <a:defRPr sz="2400">
+              <a:buClr>
+                <a:srgbClr val="2675B4"/>
+              </a:buClr>
+              <a:buFont typeface="Wingdings" charset="2"/>
+              <a:buChar char="§"/>
+              <a:defRPr>
                 <a:solidFill>
                   <a:schemeClr val="tx1"/>
                 </a:solidFill>
-                <a:latin typeface="Times" charset="0"/>
-                <a:ea typeface="Osaka" charset="-128"/>
+                <a:latin typeface="+mn-lt"/>
+                <a:ea typeface="+mn-ea"/>
+                <a:cs typeface="+mn-cs"/>
               </a:defRPr>
-            </a:lvl8pPr>
-            <a:lvl9pPr marL="3886200" indent="-228600" eaLnBrk="0" fontAlgn="base" hangingPunct="0">
+            </a:lvl3pPr>
+            <a:lvl4pPr marL="1600200" indent="-228600" algn="l" rtl="0" eaLnBrk="0" fontAlgn="base" hangingPunct="0">
               <a:spcBef>
-                <a:spcPct val="0"/>
+                <a:spcPct val="20000"/>
               </a:spcBef>
               <a:spcAft>
                 <a:spcPct val="0"/>
               </a:spcAft>
-              <a:defRPr sz="2400">
+              <a:buClr>
+                <a:srgbClr val="2675B4"/>
+              </a:buClr>
+              <a:buFont typeface="Wingdings" charset="2"/>
+              <a:buChar char="§"/>
+              <a:defRPr>
                 <a:solidFill>
                   <a:schemeClr val="tx1"/>
                 </a:solidFill>
-                <a:latin typeface="Times" charset="0"/>
-                <a:ea typeface="Osaka" charset="-128"/>
+                <a:latin typeface="+mn-lt"/>
+                <a:ea typeface="+mn-ea"/>
+                <a:cs typeface="+mn-cs"/>
+              </a:defRPr>
+            </a:lvl4pPr>
+            <a:lvl5pPr marL="2057400" indent="-228600" algn="l" rtl="0" eaLnBrk="0" fontAlgn="base" hangingPunct="0">
+              <a:spcBef>
+                <a:spcPct val="20000"/>
+              </a:spcBef>
+              <a:spcAft>
+                <a:spcPct val="0"/>
+              </a:spcAft>
+              <a:buClr>
+                <a:srgbClr val="2675B4"/>
+              </a:buClr>
+              <a:buFont typeface="Wingdings" charset="2"/>
+              <a:buChar char="§"/>
+              <a:defRPr>
+                <a:solidFill>
+                  <a:schemeClr val="tx1"/>
+                </a:solidFill>
+                <a:latin typeface="+mn-lt"/>
+                <a:ea typeface="+mn-ea"/>
+                <a:cs typeface="+mn-cs"/>
+              </a:defRPr>
+            </a:lvl5pPr>
+            <a:lvl6pPr marL="2514600" indent="-228600" algn="l" rtl="0" fontAlgn="base">
+              <a:spcBef>
+                <a:spcPct val="20000"/>
+              </a:spcBef>
+              <a:spcAft>
+                <a:spcPct val="0"/>
+              </a:spcAft>
+              <a:buClr>
+                <a:srgbClr val="2675B4"/>
+              </a:buClr>
+              <a:buFont typeface="Wingdings" charset="2"/>
+              <a:buChar char="§"/>
+              <a:defRPr>
+                <a:solidFill>
+                  <a:schemeClr val="tx1"/>
+                </a:solidFill>
+                <a:latin typeface="+mn-lt"/>
+                <a:ea typeface="+mn-ea"/>
+                <a:cs typeface="+mn-cs"/>
+              </a:defRPr>
+            </a:lvl6pPr>
+            <a:lvl7pPr marL="2971800" indent="-228600" algn="l" rtl="0" fontAlgn="base">
+              <a:spcBef>
+                <a:spcPct val="20000"/>
+              </a:spcBef>
+              <a:spcAft>
+                <a:spcPct val="0"/>
+              </a:spcAft>
+              <a:buClr>
+                <a:srgbClr val="2675B4"/>
+              </a:buClr>
+              <a:buFont typeface="Wingdings" charset="2"/>
+              <a:buChar char="§"/>
+              <a:defRPr>
+                <a:solidFill>
+                  <a:schemeClr val="tx1"/>
+                </a:solidFill>
+                <a:latin typeface="+mn-lt"/>
+                <a:ea typeface="+mn-ea"/>
+                <a:cs typeface="+mn-cs"/>
+              </a:defRPr>
+            </a:lvl7pPr>
+            <a:lvl8pPr marL="3429000" indent="-228600" algn="l" rtl="0" fontAlgn="base">
+              <a:spcBef>
+                <a:spcPct val="20000"/>
+              </a:spcBef>
+              <a:spcAft>
+                <a:spcPct val="0"/>
+              </a:spcAft>
+              <a:buClr>
+                <a:srgbClr val="2675B4"/>
+              </a:buClr>
+              <a:buFont typeface="Wingdings" charset="2"/>
+              <a:buChar char="§"/>
+              <a:defRPr>
+                <a:solidFill>
+                  <a:schemeClr val="tx1"/>
+                </a:solidFill>
+                <a:latin typeface="+mn-lt"/>
+                <a:ea typeface="+mn-ea"/>
+                <a:cs typeface="+mn-cs"/>
+              </a:defRPr>
+            </a:lvl8pPr>
+            <a:lvl9pPr marL="3886200" indent="-228600" algn="l" rtl="0" fontAlgn="base">
+              <a:spcBef>
+                <a:spcPct val="20000"/>
+              </a:spcBef>
+              <a:spcAft>
+                <a:spcPct val="0"/>
+              </a:spcAft>
+              <a:buClr>
+                <a:srgbClr val="2675B4"/>
+              </a:buClr>
+              <a:buFont typeface="Wingdings" charset="2"/>
+              <a:buChar char="§"/>
+              <a:defRPr>
+                <a:solidFill>
+                  <a:schemeClr val="tx1"/>
+                </a:solidFill>
+                <a:latin typeface="+mn-lt"/>
+                <a:ea typeface="+mn-ea"/>
+                <a:cs typeface="+mn-cs"/>
               </a:defRPr>
             </a:lvl9pPr>
           </a:lstStyle>
           <a:p>
-            <a:fld id="{FC8D6845-82E4-4747-951B-5F0D5342441F}" type="slidenum">
-              <a:rPr lang="en-US" altLang="en-US" sz="4400" smtClean="0">
-                <a:solidFill>
-                  <a:srgbClr val="D9D9D9"/>
-                </a:solidFill>
-                <a:latin typeface="Arial" charset="0"/>
-              </a:rPr>
-              <a:pPr/>
-              <a:t>2</a:t>
-            </a:fld>
-            <a:endParaRPr lang="en-US" altLang="en-US" sz="4400" dirty="0">
-              <a:solidFill>
-                <a:srgbClr val="D9D9D9"/>
-              </a:solidFill>
-              <a:latin typeface="Arial" charset="0"/>
-            </a:endParaRPr>
-          </a:p>
-        </p:txBody>
-      </p:sp>
-      <p:sp>
-        <p:nvSpPr>
-          <p:cNvPr id="4100" name="Date Placeholder 5"/>
-          <p:cNvSpPr>
-            <a:spLocks noGrp="1"/>
-          </p:cNvSpPr>
-          <p:nvPr>
-            <p:ph type="dt" sz="quarter" idx="12"/>
-          </p:nvPr>
-        </p:nvSpPr>
-        <p:spPr>
+            <a:pPr marL="0" indent="0">
+              <a:buFont typeface="Wingdings" charset="2"/>
+              <a:buNone/>
+            </a:pPr>
+            <a:r>
+              <a:rPr lang="en-US" sz="2200" b="1" dirty="0" smtClean="0"/>
+              <a:t>Committee </a:t>
+            </a:r>
+          </a:p>
+          <a:p>
+            <a:r>
+              <a:rPr lang="en-US" sz="2000" dirty="0" smtClean="0"/>
+              <a:t>Steve Colburn</a:t>
+            </a:r>
+          </a:p>
+          <a:p>
+            <a:r>
+              <a:rPr lang="en-US" sz="2000" dirty="0" smtClean="0"/>
+              <a:t>Barb Shinn-Cunningham</a:t>
+            </a:r>
+          </a:p>
+          <a:p>
+            <a:r>
+              <a:rPr lang="en-US" sz="2000" dirty="0" err="1" smtClean="0"/>
+              <a:t>Allyn</a:t>
+            </a:r>
+            <a:r>
+              <a:rPr lang="en-US" sz="2000" dirty="0" smtClean="0"/>
+              <a:t> Hubbard</a:t>
+            </a:r>
+          </a:p>
+          <a:p>
+            <a:r>
+              <a:rPr lang="en-US" sz="2000" dirty="0" smtClean="0"/>
+              <a:t>Heidi Nakajima</a:t>
+            </a:r>
+          </a:p>
+        </p:txBody>
+      </p:sp>
+      <p:sp>
+        <p:nvSpPr>
+          <p:cNvPr id="9" name="Content Placeholder 2"/>
+          <p:cNvSpPr txBox="1">
+            <a:spLocks/>
+          </p:cNvSpPr>
+          <p:nvPr/>
+        </p:nvSpPr>
+        <p:spPr bwMode="auto">
           <a:xfrm>
-            <a:off x="6248400" y="0"/>
-            <a:ext cx="2286000" cy="304800"/>
+            <a:off x="5105400" y="1219200"/>
+            <a:ext cx="3886200" cy="1981200"/>
           </a:xfrm>
+          <a:prstGeom prst="rect">
+            <a:avLst/>
+          </a:prstGeom>
           <a:noFill/>
-          <a:ln/>
+          <a:ln>
+            <a:noFill/>
+          </a:ln>
           <a:extLst>
-            <a:ext uri="{909E8E84-426E-40DD-AFC4-6F175D3DCCD1}">
+            <a:ext uri="{909E8E84-426E-40dd-AFC4-6F175D3DCCD1}">
               <a14:hiddenFill xmlns:a14="http://schemas.microsoft.com/office/drawing/2010/main">
                 <a:solidFill>
                   <a:srgbClr val="FFFFFF"/>
                 </a:solidFill>
               </a14:hiddenFill>
             </a:ext>
-            <a:ext uri="{91240B29-F687-4F45-9708-019B960494DF}">
+            <a:ext uri="{91240B29-F687-4f45-9708-019B960494DF}">
               <a14:hiddenLine xmlns:a14="http://schemas.microsoft.com/office/drawing/2010/main" w="9525">
                 <a:solidFill>
                   <a:srgbClr val="000000"/>
@@ -5809,141 +7129,582 @@
           </a:extLst>
         </p:spPr>
         <p:txBody>
-          <a:bodyPr/>
+          <a:bodyPr vert="horz" wrap="square" lIns="91440" tIns="45720" rIns="91440" bIns="45720" numCol="1" anchor="t" anchorCtr="0" compatLnSpc="1">
+            <a:prstTxWarp prst="textNoShape">
+              <a:avLst/>
+            </a:prstTxWarp>
+          </a:bodyPr>
           <a:lstStyle>
-            <a:lvl1pPr>
-              <a:defRPr sz="2400">
-                <a:solidFill>
-                  <a:schemeClr val="tx1"/>
-                </a:solidFill>
-                <a:latin typeface="Times" charset="0"/>
-                <a:ea typeface="Osaka" charset="-128"/>
-              </a:defRPr>
-            </a:lvl1pPr>
-            <a:lvl2pPr marL="37931725" indent="-37474525">
-              <a:defRPr sz="2400">
-                <a:solidFill>
-                  <a:schemeClr val="tx1"/>
-                </a:solidFill>
-                <a:latin typeface="Times" charset="0"/>
-                <a:ea typeface="Osaka" charset="-128"/>
-              </a:defRPr>
-            </a:lvl2pPr>
-            <a:lvl3pPr marL="1143000" indent="-228600">
-              <a:defRPr sz="2400">
-                <a:solidFill>
-                  <a:schemeClr val="tx1"/>
-                </a:solidFill>
-                <a:latin typeface="Times" charset="0"/>
-                <a:ea typeface="Osaka" charset="-128"/>
-              </a:defRPr>
-            </a:lvl3pPr>
-            <a:lvl4pPr marL="1600200" indent="-228600">
-              <a:defRPr sz="2400">
-                <a:solidFill>
-                  <a:schemeClr val="tx1"/>
-                </a:solidFill>
-                <a:latin typeface="Times" charset="0"/>
-                <a:ea typeface="Osaka" charset="-128"/>
-              </a:defRPr>
-            </a:lvl4pPr>
-            <a:lvl5pPr marL="2057400" indent="-228600">
-              <a:defRPr sz="2400">
-                <a:solidFill>
-                  <a:schemeClr val="tx1"/>
-                </a:solidFill>
-                <a:latin typeface="Times" charset="0"/>
-                <a:ea typeface="Osaka" charset="-128"/>
-              </a:defRPr>
-            </a:lvl5pPr>
-            <a:lvl6pPr marL="2514600" indent="-228600" eaLnBrk="0" fontAlgn="base" hangingPunct="0">
+            <a:lvl1pPr marL="342900" indent="-342900" algn="l" rtl="0" eaLnBrk="0" fontAlgn="base" hangingPunct="0">
               <a:spcBef>
-                <a:spcPct val="0"/>
+                <a:spcPct val="20000"/>
               </a:spcBef>
               <a:spcAft>
                 <a:spcPct val="0"/>
               </a:spcAft>
+              <a:buClr>
+                <a:srgbClr val="2675B4"/>
+              </a:buClr>
+              <a:buFont typeface="Wingdings" charset="2"/>
+              <a:buChar char="§"/>
               <a:defRPr sz="2400">
                 <a:solidFill>
                   <a:schemeClr val="tx1"/>
                 </a:solidFill>
-                <a:latin typeface="Times" charset="0"/>
-                <a:ea typeface="Osaka" charset="-128"/>
+                <a:latin typeface="+mn-lt"/>
+                <a:ea typeface="+mn-ea"/>
+                <a:cs typeface="+mn-cs"/>
               </a:defRPr>
-            </a:lvl6pPr>
-            <a:lvl7pPr marL="2971800" indent="-228600" eaLnBrk="0" fontAlgn="base" hangingPunct="0">
+            </a:lvl1pPr>
+            <a:lvl2pPr marL="742950" indent="-285750" algn="l" rtl="0" eaLnBrk="0" fontAlgn="base" hangingPunct="0">
               <a:spcBef>
-                <a:spcPct val="0"/>
+                <a:spcPct val="20000"/>
               </a:spcBef>
               <a:spcAft>
                 <a:spcPct val="0"/>
               </a:spcAft>
-              <a:defRPr sz="2400">
+              <a:buClr>
+                <a:srgbClr val="2675B4"/>
+              </a:buClr>
+              <a:buFont typeface="Wingdings" charset="2"/>
+              <a:buChar char="§"/>
+              <a:defRPr>
                 <a:solidFill>
                   <a:schemeClr val="tx1"/>
                 </a:solidFill>
-                <a:latin typeface="Times" charset="0"/>
-                <a:ea typeface="Osaka" charset="-128"/>
+                <a:latin typeface="+mn-lt"/>
+                <a:ea typeface="+mn-ea"/>
+                <a:cs typeface="+mn-cs"/>
               </a:defRPr>
-            </a:lvl7pPr>
-            <a:lvl8pPr marL="3429000" indent="-228600" eaLnBrk="0" fontAlgn="base" hangingPunct="0">
+            </a:lvl2pPr>
+            <a:lvl3pPr marL="1143000" indent="-228600" algn="l" rtl="0" eaLnBrk="0" fontAlgn="base" hangingPunct="0">
               <a:spcBef>
-                <a:spcPct val="0"/>
+                <a:spcPct val="20000"/>
               </a:spcBef>
               <a:spcAft>
                 <a:spcPct val="0"/>
               </a:spcAft>
-              <a:defRPr sz="2400">
+              <a:buClr>
+                <a:srgbClr val="2675B4"/>
+              </a:buClr>
+              <a:buFont typeface="Wingdings" charset="2"/>
+              <a:buChar char="§"/>
+              <a:defRPr>
                 <a:solidFill>
                   <a:schemeClr val="tx1"/>
                 </a:solidFill>
-                <a:latin typeface="Times" charset="0"/>
-                <a:ea typeface="Osaka" charset="-128"/>
+                <a:latin typeface="+mn-lt"/>
+                <a:ea typeface="+mn-ea"/>
+                <a:cs typeface="+mn-cs"/>
               </a:defRPr>
-            </a:lvl8pPr>
-            <a:lvl9pPr marL="3886200" indent="-228600" eaLnBrk="0" fontAlgn="base" hangingPunct="0">
+            </a:lvl3pPr>
+            <a:lvl4pPr marL="1600200" indent="-228600" algn="l" rtl="0" eaLnBrk="0" fontAlgn="base" hangingPunct="0">
               <a:spcBef>
-                <a:spcPct val="0"/>
+                <a:spcPct val="20000"/>
               </a:spcBef>
               <a:spcAft>
                 <a:spcPct val="0"/>
               </a:spcAft>
-              <a:defRPr sz="2400">
+              <a:buClr>
+                <a:srgbClr val="2675B4"/>
+              </a:buClr>
+              <a:buFont typeface="Wingdings" charset="2"/>
+              <a:buChar char="§"/>
+              <a:defRPr>
                 <a:solidFill>
                   <a:schemeClr val="tx1"/>
                 </a:solidFill>
-                <a:latin typeface="Times" charset="0"/>
-                <a:ea typeface="Osaka" charset="-128"/>
+                <a:latin typeface="+mn-lt"/>
+                <a:ea typeface="+mn-ea"/>
+                <a:cs typeface="+mn-cs"/>
+              </a:defRPr>
+            </a:lvl4pPr>
+            <a:lvl5pPr marL="2057400" indent="-228600" algn="l" rtl="0" eaLnBrk="0" fontAlgn="base" hangingPunct="0">
+              <a:spcBef>
+                <a:spcPct val="20000"/>
+              </a:spcBef>
+              <a:spcAft>
+                <a:spcPct val="0"/>
+              </a:spcAft>
+              <a:buClr>
+                <a:srgbClr val="2675B4"/>
+              </a:buClr>
+              <a:buFont typeface="Wingdings" charset="2"/>
+              <a:buChar char="§"/>
+              <a:defRPr>
+                <a:solidFill>
+                  <a:schemeClr val="tx1"/>
+                </a:solidFill>
+                <a:latin typeface="+mn-lt"/>
+                <a:ea typeface="+mn-ea"/>
+                <a:cs typeface="+mn-cs"/>
+              </a:defRPr>
+            </a:lvl5pPr>
+            <a:lvl6pPr marL="2514600" indent="-228600" algn="l" rtl="0" fontAlgn="base">
+              <a:spcBef>
+                <a:spcPct val="20000"/>
+              </a:spcBef>
+              <a:spcAft>
+                <a:spcPct val="0"/>
+              </a:spcAft>
+              <a:buClr>
+                <a:srgbClr val="2675B4"/>
+              </a:buClr>
+              <a:buFont typeface="Wingdings" charset="2"/>
+              <a:buChar char="§"/>
+              <a:defRPr>
+                <a:solidFill>
+                  <a:schemeClr val="tx1"/>
+                </a:solidFill>
+                <a:latin typeface="+mn-lt"/>
+                <a:ea typeface="+mn-ea"/>
+                <a:cs typeface="+mn-cs"/>
+              </a:defRPr>
+            </a:lvl6pPr>
+            <a:lvl7pPr marL="2971800" indent="-228600" algn="l" rtl="0" fontAlgn="base">
+              <a:spcBef>
+                <a:spcPct val="20000"/>
+              </a:spcBef>
+              <a:spcAft>
+                <a:spcPct val="0"/>
+              </a:spcAft>
+              <a:buClr>
+                <a:srgbClr val="2675B4"/>
+              </a:buClr>
+              <a:buFont typeface="Wingdings" charset="2"/>
+              <a:buChar char="§"/>
+              <a:defRPr>
+                <a:solidFill>
+                  <a:schemeClr val="tx1"/>
+                </a:solidFill>
+                <a:latin typeface="+mn-lt"/>
+                <a:ea typeface="+mn-ea"/>
+                <a:cs typeface="+mn-cs"/>
+              </a:defRPr>
+            </a:lvl7pPr>
+            <a:lvl8pPr marL="3429000" indent="-228600" algn="l" rtl="0" fontAlgn="base">
+              <a:spcBef>
+                <a:spcPct val="20000"/>
+              </a:spcBef>
+              <a:spcAft>
+                <a:spcPct val="0"/>
+              </a:spcAft>
+              <a:buClr>
+                <a:srgbClr val="2675B4"/>
+              </a:buClr>
+              <a:buFont typeface="Wingdings" charset="2"/>
+              <a:buChar char="§"/>
+              <a:defRPr>
+                <a:solidFill>
+                  <a:schemeClr val="tx1"/>
+                </a:solidFill>
+                <a:latin typeface="+mn-lt"/>
+                <a:ea typeface="+mn-ea"/>
+                <a:cs typeface="+mn-cs"/>
+              </a:defRPr>
+            </a:lvl8pPr>
+            <a:lvl9pPr marL="3886200" indent="-228600" algn="l" rtl="0" fontAlgn="base">
+              <a:spcBef>
+                <a:spcPct val="20000"/>
+              </a:spcBef>
+              <a:spcAft>
+                <a:spcPct val="0"/>
+              </a:spcAft>
+              <a:buClr>
+                <a:srgbClr val="2675B4"/>
+              </a:buClr>
+              <a:buFont typeface="Wingdings" charset="2"/>
+              <a:buChar char="§"/>
+              <a:defRPr>
+                <a:solidFill>
+                  <a:schemeClr val="tx1"/>
+                </a:solidFill>
+                <a:latin typeface="+mn-lt"/>
+                <a:ea typeface="+mn-ea"/>
+                <a:cs typeface="+mn-cs"/>
               </a:defRPr>
             </a:lvl9pPr>
           </a:lstStyle>
           <a:p>
-            <a:fld id="{6C24F4BA-1D1C-40C2-A186-BAF0C851D709}" type="datetime1">
-              <a:rPr lang="en-US" altLang="en-US" sz="1200" smtClean="0">
-                <a:solidFill>
-                  <a:srgbClr val="808080"/>
-                </a:solidFill>
-                <a:latin typeface="Arial" charset="0"/>
-              </a:rPr>
-              <a:t>Monday, 01 February 2016</a:t>
-            </a:fld>
-            <a:endParaRPr lang="en-US" altLang="en-US" sz="1200">
-              <a:solidFill>
-                <a:srgbClr val="808080"/>
-              </a:solidFill>
-              <a:latin typeface="Arial" charset="0"/>
-            </a:endParaRPr>
-          </a:p>
-        </p:txBody>
-      </p:sp>
-      <p:sp>
-        <p:nvSpPr>
-          <p:cNvPr id="4101" name="Rectangle 2"/>
-          <p:cNvSpPr>
-            <a:spLocks noGrp="1" noChangeArrowheads="1"/>
-          </p:cNvSpPr>
-          <p:nvPr>
-            <p:ph type="title"/>
+            <a:pPr marL="0" indent="0">
+              <a:buFont typeface="Wingdings" charset="2"/>
+              <a:buNone/>
+            </a:pPr>
+            <a:r>
+              <a:rPr lang="en-US" sz="2200" b="1" dirty="0" smtClean="0"/>
+              <a:t>BU Alumni and Visitors</a:t>
+            </a:r>
+          </a:p>
+          <a:p>
+            <a:r>
+              <a:rPr lang="en-US" sz="2000" dirty="0" smtClean="0"/>
+              <a:t>Sarah </a:t>
+            </a:r>
+            <a:r>
+              <a:rPr lang="en-US" sz="2000" dirty="0" err="1" smtClean="0"/>
+              <a:t>Verhulst</a:t>
+            </a:r>
+            <a:endParaRPr lang="en-US" sz="2000" dirty="0" smtClean="0"/>
+          </a:p>
+          <a:p>
+            <a:r>
+              <a:rPr lang="en-US" sz="2000" dirty="0" smtClean="0"/>
+              <a:t>Laurel Carney</a:t>
+            </a:r>
+          </a:p>
+          <a:p>
+            <a:r>
+              <a:rPr lang="en-US" sz="2000" dirty="0" smtClean="0"/>
+              <a:t>Gerard </a:t>
+            </a:r>
+            <a:r>
+              <a:rPr lang="en-US" sz="2000" dirty="0" err="1" smtClean="0"/>
+              <a:t>Encina</a:t>
+            </a:r>
+            <a:r>
+              <a:rPr lang="en-US" sz="2000" dirty="0" smtClean="0"/>
+              <a:t>-Llamas</a:t>
+            </a:r>
+          </a:p>
+          <a:p>
+            <a:r>
+              <a:rPr lang="en-US" sz="2000" dirty="0" smtClean="0"/>
+              <a:t>Daryl </a:t>
+            </a:r>
+            <a:r>
+              <a:rPr lang="en-US" sz="2000" dirty="0" err="1" smtClean="0"/>
+              <a:t>Kelvasa</a:t>
+            </a:r>
+            <a:endParaRPr lang="en-US" sz="2000" dirty="0" smtClean="0"/>
+          </a:p>
+        </p:txBody>
+      </p:sp>
+      <p:sp>
+        <p:nvSpPr>
+          <p:cNvPr id="10" name="Content Placeholder 2"/>
+          <p:cNvSpPr txBox="1">
+            <a:spLocks/>
+          </p:cNvSpPr>
+          <p:nvPr/>
+        </p:nvSpPr>
+        <p:spPr bwMode="auto">
+          <a:xfrm>
+            <a:off x="5105400" y="3200400"/>
+            <a:ext cx="3886200" cy="3200400"/>
+          </a:xfrm>
+          <a:prstGeom prst="rect">
+            <a:avLst/>
+          </a:prstGeom>
+          <a:noFill/>
+          <a:ln>
+            <a:noFill/>
+          </a:ln>
+          <a:extLst>
+            <a:ext uri="{909E8E84-426E-40dd-AFC4-6F175D3DCCD1}">
+              <a14:hiddenFill xmlns:a14="http://schemas.microsoft.com/office/drawing/2010/main">
+                <a:solidFill>
+                  <a:srgbClr val="FFFFFF"/>
+                </a:solidFill>
+              </a14:hiddenFill>
+            </a:ext>
+            <a:ext uri="{91240B29-F687-4f45-9708-019B960494DF}">
+              <a14:hiddenLine xmlns:a14="http://schemas.microsoft.com/office/drawing/2010/main" w="9525">
+                <a:solidFill>
+                  <a:srgbClr val="000000"/>
+                </a:solidFill>
+                <a:miter lim="800000"/>
+                <a:headEnd/>
+                <a:tailEnd/>
+              </a14:hiddenLine>
+            </a:ext>
+          </a:extLst>
+        </p:spPr>
+        <p:txBody>
+          <a:bodyPr vert="horz" wrap="square" lIns="91440" tIns="45720" rIns="91440" bIns="45720" numCol="1" anchor="t" anchorCtr="0" compatLnSpc="1">
+            <a:prstTxWarp prst="textNoShape">
+              <a:avLst/>
+            </a:prstTxWarp>
+          </a:bodyPr>
+          <a:lstStyle>
+            <a:lvl1pPr marL="342900" indent="-342900" algn="l" rtl="0" eaLnBrk="0" fontAlgn="base" hangingPunct="0">
+              <a:spcBef>
+                <a:spcPct val="20000"/>
+              </a:spcBef>
+              <a:spcAft>
+                <a:spcPct val="0"/>
+              </a:spcAft>
+              <a:buClr>
+                <a:srgbClr val="2675B4"/>
+              </a:buClr>
+              <a:buFont typeface="Wingdings" charset="2"/>
+              <a:buChar char="§"/>
+              <a:defRPr sz="2400">
+                <a:solidFill>
+                  <a:schemeClr val="tx1"/>
+                </a:solidFill>
+                <a:latin typeface="+mn-lt"/>
+                <a:ea typeface="+mn-ea"/>
+                <a:cs typeface="+mn-cs"/>
+              </a:defRPr>
+            </a:lvl1pPr>
+            <a:lvl2pPr marL="742950" indent="-285750" algn="l" rtl="0" eaLnBrk="0" fontAlgn="base" hangingPunct="0">
+              <a:spcBef>
+                <a:spcPct val="20000"/>
+              </a:spcBef>
+              <a:spcAft>
+                <a:spcPct val="0"/>
+              </a:spcAft>
+              <a:buClr>
+                <a:srgbClr val="2675B4"/>
+              </a:buClr>
+              <a:buFont typeface="Wingdings" charset="2"/>
+              <a:buChar char="§"/>
+              <a:defRPr>
+                <a:solidFill>
+                  <a:schemeClr val="tx1"/>
+                </a:solidFill>
+                <a:latin typeface="+mn-lt"/>
+                <a:ea typeface="+mn-ea"/>
+                <a:cs typeface="+mn-cs"/>
+              </a:defRPr>
+            </a:lvl2pPr>
+            <a:lvl3pPr marL="1143000" indent="-228600" algn="l" rtl="0" eaLnBrk="0" fontAlgn="base" hangingPunct="0">
+              <a:spcBef>
+                <a:spcPct val="20000"/>
+              </a:spcBef>
+              <a:spcAft>
+                <a:spcPct val="0"/>
+              </a:spcAft>
+              <a:buClr>
+                <a:srgbClr val="2675B4"/>
+              </a:buClr>
+              <a:buFont typeface="Wingdings" charset="2"/>
+              <a:buChar char="§"/>
+              <a:defRPr>
+                <a:solidFill>
+                  <a:schemeClr val="tx1"/>
+                </a:solidFill>
+                <a:latin typeface="+mn-lt"/>
+                <a:ea typeface="+mn-ea"/>
+                <a:cs typeface="+mn-cs"/>
+              </a:defRPr>
+            </a:lvl3pPr>
+            <a:lvl4pPr marL="1600200" indent="-228600" algn="l" rtl="0" eaLnBrk="0" fontAlgn="base" hangingPunct="0">
+              <a:spcBef>
+                <a:spcPct val="20000"/>
+              </a:spcBef>
+              <a:spcAft>
+                <a:spcPct val="0"/>
+              </a:spcAft>
+              <a:buClr>
+                <a:srgbClr val="2675B4"/>
+              </a:buClr>
+              <a:buFont typeface="Wingdings" charset="2"/>
+              <a:buChar char="§"/>
+              <a:defRPr>
+                <a:solidFill>
+                  <a:schemeClr val="tx1"/>
+                </a:solidFill>
+                <a:latin typeface="+mn-lt"/>
+                <a:ea typeface="+mn-ea"/>
+                <a:cs typeface="+mn-cs"/>
+              </a:defRPr>
+            </a:lvl4pPr>
+            <a:lvl5pPr marL="2057400" indent="-228600" algn="l" rtl="0" eaLnBrk="0" fontAlgn="base" hangingPunct="0">
+              <a:spcBef>
+                <a:spcPct val="20000"/>
+              </a:spcBef>
+              <a:spcAft>
+                <a:spcPct val="0"/>
+              </a:spcAft>
+              <a:buClr>
+                <a:srgbClr val="2675B4"/>
+              </a:buClr>
+              <a:buFont typeface="Wingdings" charset="2"/>
+              <a:buChar char="§"/>
+              <a:defRPr>
+                <a:solidFill>
+                  <a:schemeClr val="tx1"/>
+                </a:solidFill>
+                <a:latin typeface="+mn-lt"/>
+                <a:ea typeface="+mn-ea"/>
+                <a:cs typeface="+mn-cs"/>
+              </a:defRPr>
+            </a:lvl5pPr>
+            <a:lvl6pPr marL="2514600" indent="-228600" algn="l" rtl="0" fontAlgn="base">
+              <a:spcBef>
+                <a:spcPct val="20000"/>
+              </a:spcBef>
+              <a:spcAft>
+                <a:spcPct val="0"/>
+              </a:spcAft>
+              <a:buClr>
+                <a:srgbClr val="2675B4"/>
+              </a:buClr>
+              <a:buFont typeface="Wingdings" charset="2"/>
+              <a:buChar char="§"/>
+              <a:defRPr>
+                <a:solidFill>
+                  <a:schemeClr val="tx1"/>
+                </a:solidFill>
+                <a:latin typeface="+mn-lt"/>
+                <a:ea typeface="+mn-ea"/>
+                <a:cs typeface="+mn-cs"/>
+              </a:defRPr>
+            </a:lvl6pPr>
+            <a:lvl7pPr marL="2971800" indent="-228600" algn="l" rtl="0" fontAlgn="base">
+              <a:spcBef>
+                <a:spcPct val="20000"/>
+              </a:spcBef>
+              <a:spcAft>
+                <a:spcPct val="0"/>
+              </a:spcAft>
+              <a:buClr>
+                <a:srgbClr val="2675B4"/>
+              </a:buClr>
+              <a:buFont typeface="Wingdings" charset="2"/>
+              <a:buChar char="§"/>
+              <a:defRPr>
+                <a:solidFill>
+                  <a:schemeClr val="tx1"/>
+                </a:solidFill>
+                <a:latin typeface="+mn-lt"/>
+                <a:ea typeface="+mn-ea"/>
+                <a:cs typeface="+mn-cs"/>
+              </a:defRPr>
+            </a:lvl7pPr>
+            <a:lvl8pPr marL="3429000" indent="-228600" algn="l" rtl="0" fontAlgn="base">
+              <a:spcBef>
+                <a:spcPct val="20000"/>
+              </a:spcBef>
+              <a:spcAft>
+                <a:spcPct val="0"/>
+              </a:spcAft>
+              <a:buClr>
+                <a:srgbClr val="2675B4"/>
+              </a:buClr>
+              <a:buFont typeface="Wingdings" charset="2"/>
+              <a:buChar char="§"/>
+              <a:defRPr>
+                <a:solidFill>
+                  <a:schemeClr val="tx1"/>
+                </a:solidFill>
+                <a:latin typeface="+mn-lt"/>
+                <a:ea typeface="+mn-ea"/>
+                <a:cs typeface="+mn-cs"/>
+              </a:defRPr>
+            </a:lvl8pPr>
+            <a:lvl9pPr marL="3886200" indent="-228600" algn="l" rtl="0" fontAlgn="base">
+              <a:spcBef>
+                <a:spcPct val="20000"/>
+              </a:spcBef>
+              <a:spcAft>
+                <a:spcPct val="0"/>
+              </a:spcAft>
+              <a:buClr>
+                <a:srgbClr val="2675B4"/>
+              </a:buClr>
+              <a:buFont typeface="Wingdings" charset="2"/>
+              <a:buChar char="§"/>
+              <a:defRPr>
+                <a:solidFill>
+                  <a:schemeClr val="tx1"/>
+                </a:solidFill>
+                <a:latin typeface="+mn-lt"/>
+                <a:ea typeface="+mn-ea"/>
+                <a:cs typeface="+mn-cs"/>
+              </a:defRPr>
+            </a:lvl9pPr>
+          </a:lstStyle>
+          <a:p>
+            <a:pPr marL="0" indent="0">
+              <a:buFont typeface="Wingdings" charset="2"/>
+              <a:buNone/>
+            </a:pPr>
+            <a:r>
+              <a:rPr lang="en-US" sz="2200" b="1" dirty="0" smtClean="0"/>
+              <a:t>Personal</a:t>
+            </a:r>
+          </a:p>
+          <a:p>
+            <a:r>
+              <a:rPr lang="en-US" sz="2000" dirty="0" smtClean="0"/>
+              <a:t>My family!</a:t>
+            </a:r>
+          </a:p>
+          <a:p>
+            <a:endParaRPr lang="en-US" sz="2000" dirty="0" smtClean="0"/>
+          </a:p>
+        </p:txBody>
+      </p:sp>
+      <p:pic>
+        <p:nvPicPr>
+          <p:cNvPr id="11" name="Picture 10" descr="IMG_0340.jpg"/>
+          <p:cNvPicPr>
+            <a:picLocks noChangeAspect="1"/>
+          </p:cNvPicPr>
+          <p:nvPr/>
+        </p:nvPicPr>
+        <p:blipFill>
+          <a:blip r:embed="rId2">
+            <a:extLst>
+              <a:ext uri="{28A0092B-C50C-407E-A947-70E740481C1C}">
+                <a14:useLocalDpi xmlns:a14="http://schemas.microsoft.com/office/drawing/2010/main" val="0"/>
+              </a:ext>
+            </a:extLst>
+          </a:blip>
+          <a:stretch>
+            <a:fillRect/>
+          </a:stretch>
+        </p:blipFill>
+        <p:spPr>
+          <a:xfrm>
+            <a:off x="6858000" y="4038600"/>
+            <a:ext cx="1770785" cy="2362200"/>
+          </a:xfrm>
+          <a:prstGeom prst="rect">
+            <a:avLst/>
+          </a:prstGeom>
+        </p:spPr>
+      </p:pic>
+    </p:spTree>
+    <p:extLst>
+      <p:ext uri="{BB962C8B-B14F-4D97-AF65-F5344CB8AC3E}">
+        <p14:creationId xmlns:p14="http://schemas.microsoft.com/office/powerpoint/2010/main" val="3825096128"/>
+      </p:ext>
+    </p:extLst>
+  </p:cSld>
+  <p:clrMapOvr>
+    <a:masterClrMapping/>
+  </p:clrMapOvr>
+</p:sld>
+</file>
+
+<file path=ppt/slides/slide6.xml><?xml version="1.0" encoding="utf-8"?>
+<p:sld xmlns:a="http://schemas.openxmlformats.org/drawingml/2006/main" xmlns:r="http://schemas.openxmlformats.org/officeDocument/2006/relationships" xmlns:p="http://schemas.openxmlformats.org/presentationml/2006/main">
+  <p:cSld>
+    <p:spTree>
+      <p:nvGrpSpPr>
+        <p:cNvPr id="1" name=""/>
+        <p:cNvGrpSpPr/>
+        <p:nvPr/>
+      </p:nvGrpSpPr>
+      <p:grpSpPr>
+        <a:xfrm>
+          <a:off x="0" y="0"/>
+          <a:ext cx="0" cy="0"/>
+          <a:chOff x="0" y="0"/>
+          <a:chExt cx="0" cy="0"/>
+        </a:xfrm>
+      </p:grpSpPr>
+      <p:sp>
+        <p:nvSpPr>
+          <p:cNvPr id="4" name="Footer Placeholder 3"/>
+          <p:cNvSpPr>
+            <a:spLocks noGrp="1"/>
+          </p:cNvSpPr>
+          <p:nvPr>
+            <p:ph type="ftr" sz="quarter" idx="10"/>
           </p:nvPr>
         </p:nvSpPr>
         <p:spPr/>
@@ -5951,27 +7712,24 @@
           <a:bodyPr/>
           <a:lstStyle/>
           <a:p>
-            <a:pPr eaLnBrk="1" hangingPunct="1"/>
-            <a:r>
-              <a:rPr lang="en-US" altLang="en-US" b="1" dirty="0" smtClean="0"/>
-              <a:t>Editing</a:t>
-            </a:r>
-            <a:r>
-              <a:rPr lang="en-US" altLang="en-US" dirty="0" smtClean="0"/>
-              <a:t> this Template</a:t>
-            </a:r>
-            <a:endParaRPr lang="en-US" altLang="en-US" dirty="0" smtClean="0"/>
-          </a:p>
-        </p:txBody>
-      </p:sp>
-      <p:sp>
-        <p:nvSpPr>
-          <p:cNvPr id="4102" name="Rectangle 3"/>
-          <p:cNvSpPr>
-            <a:spLocks noGrp="1" noChangeArrowheads="1"/>
-          </p:cNvSpPr>
-          <p:nvPr>
-            <p:ph type="body" idx="1"/>
+            <a:pPr>
+              <a:defRPr/>
+            </a:pPr>
+            <a:r>
+              <a:rPr lang="en-US" altLang="en-US" dirty="0"/>
+              <a:t>Modeling the Effects of Auditory Neuropathy on the ABR</a:t>
+            </a:r>
+          </a:p>
+        </p:txBody>
+      </p:sp>
+      <p:sp>
+        <p:nvSpPr>
+          <p:cNvPr id="5" name="Slide Number Placeholder 4"/>
+          <p:cNvSpPr>
+            <a:spLocks noGrp="1"/>
+          </p:cNvSpPr>
+          <p:nvPr>
+            <p:ph type="sldNum" sz="quarter" idx="11"/>
           </p:nvPr>
         </p:nvSpPr>
         <p:spPr/>
@@ -5979,65 +7737,93 @@
           <a:bodyPr/>
           <a:lstStyle/>
           <a:p>
-            <a:pPr eaLnBrk="1" hangingPunct="1">
-              <a:buClr>
-                <a:srgbClr val="CC0000"/>
-              </a:buClr>
+            <a:pPr>
+              <a:defRPr/>
             </a:pPr>
-            <a:r>
-              <a:rPr lang="en-US" altLang="en-US" dirty="0" smtClean="0"/>
-              <a:t>The info at the top of the slide can be changed</a:t>
-            </a:r>
-          </a:p>
-          <a:p>
-            <a:pPr eaLnBrk="1" hangingPunct="1">
-              <a:buClr>
-                <a:srgbClr val="CC0000"/>
-              </a:buClr>
+            <a:fld id="{8840E231-D218-4982-B1DE-6520F190699A}" type="slidenum">
+              <a:rPr lang="en-US" altLang="en-US" smtClean="0"/>
+              <a:pPr>
+                <a:defRPr/>
+              </a:pPr>
+              <a:t>6</a:t>
+            </a:fld>
+            <a:endParaRPr lang="en-US" altLang="en-US" dirty="0"/>
+          </a:p>
+        </p:txBody>
+      </p:sp>
+      <p:sp>
+        <p:nvSpPr>
+          <p:cNvPr id="6" name="Date Placeholder 5"/>
+          <p:cNvSpPr>
+            <a:spLocks noGrp="1"/>
+          </p:cNvSpPr>
+          <p:nvPr>
+            <p:ph type="dt" sz="half" idx="12"/>
+          </p:nvPr>
+        </p:nvSpPr>
+        <p:spPr/>
+        <p:txBody>
+          <a:bodyPr/>
+          <a:lstStyle/>
+          <a:p>
+            <a:pPr>
+              <a:defRPr/>
             </a:pPr>
-            <a:r>
-              <a:rPr lang="en-US" altLang="en-US" dirty="0" smtClean="0"/>
-              <a:t>Go to the </a:t>
-            </a:r>
-            <a:r>
-              <a:rPr lang="en-US" altLang="en-US" b="1" dirty="0" smtClean="0"/>
-              <a:t>View</a:t>
-            </a:r>
-            <a:r>
-              <a:rPr lang="en-US" altLang="en-US" dirty="0" smtClean="0"/>
-              <a:t> menu and choose </a:t>
-            </a:r>
-            <a:r>
-              <a:rPr lang="en-US" altLang="en-US" b="1" dirty="0" smtClean="0"/>
-              <a:t>Header and Footer</a:t>
-            </a:r>
-          </a:p>
-          <a:p>
-            <a:pPr eaLnBrk="1" hangingPunct="1">
-              <a:buClr>
-                <a:srgbClr val="CC0000"/>
-              </a:buClr>
-            </a:pPr>
-            <a:r>
-              <a:rPr lang="en-US" altLang="en-US" dirty="0" smtClean="0"/>
-              <a:t>Then change the date and footer text</a:t>
-            </a:r>
-          </a:p>
-          <a:p>
-            <a:pPr eaLnBrk="1" hangingPunct="1">
-              <a:buClr>
-                <a:srgbClr val="CC0000"/>
-              </a:buClr>
-            </a:pPr>
-            <a:r>
-              <a:rPr lang="en-US" altLang="en-US" dirty="0" smtClean="0"/>
-              <a:t>You can also enable or disable automatic slide numbering in the Header and Footer</a:t>
-            </a:r>
-            <a:endParaRPr lang="en-US" altLang="en-US" dirty="0" smtClean="0"/>
-          </a:p>
-        </p:txBody>
-      </p:sp>
+            <a:fld id="{A544915F-7309-4744-8FAD-0D6B1CB5A275}" type="datetime1">
+              <a:rPr lang="en-US" altLang="en-US" smtClean="0"/>
+              <a:t>8/9/16</a:t>
+            </a:fld>
+            <a:endParaRPr lang="en-US" altLang="en-US"/>
+          </a:p>
+        </p:txBody>
+      </p:sp>
+      <p:pic>
+        <p:nvPicPr>
+          <p:cNvPr id="2051" name="Picture 3" descr="C:\Users\Graham Voysey\Google Drive\BU\HRC\g3133.png"/>
+          <p:cNvPicPr>
+            <a:picLocks noChangeAspect="1" noChangeArrowheads="1"/>
+          </p:cNvPicPr>
+          <p:nvPr/>
+        </p:nvPicPr>
+        <p:blipFill>
+          <a:blip r:embed="rId2">
+            <a:extLst>
+              <a:ext uri="{28A0092B-C50C-407E-A947-70E740481C1C}">
+                <a14:useLocalDpi xmlns:a14="http://schemas.microsoft.com/office/drawing/2010/main" val="0"/>
+              </a:ext>
+            </a:extLst>
+          </a:blip>
+          <a:srcRect/>
+          <a:stretch>
+            <a:fillRect/>
+          </a:stretch>
+        </p:blipFill>
+        <p:spPr bwMode="auto">
+          <a:xfrm>
+            <a:off x="2667000" y="2057400"/>
+            <a:ext cx="4135437" cy="2551112"/>
+          </a:xfrm>
+          <a:prstGeom prst="rect">
+            <a:avLst/>
+          </a:prstGeom>
+          <a:noFill/>
+          <a:extLst>
+            <a:ext uri="{909E8E84-426E-40dd-AFC4-6F175D3DCCD1}">
+              <a14:hiddenFill xmlns:a14="http://schemas.microsoft.com/office/drawing/2010/main">
+                <a:solidFill>
+                  <a:srgbClr val="FFFFFF"/>
+                </a:solidFill>
+              </a14:hiddenFill>
+            </a:ext>
+          </a:extLst>
+        </p:spPr>
+      </p:pic>
     </p:spTree>
+    <p:extLst>
+      <p:ext uri="{BB962C8B-B14F-4D97-AF65-F5344CB8AC3E}">
+        <p14:creationId xmlns:p14="http://schemas.microsoft.com/office/powerpoint/2010/main" val="3301279014"/>
+      </p:ext>
+    </p:extLst>
   </p:cSld>
   <p:clrMapOvr>
     <a:masterClrMapping/>
@@ -6045,7 +7831,7 @@
   <p:timing>
     <p:tnLst>
       <p:par>
-        <p:cTn id="1" dur="indefinite" restart="never" nodeType="tmRoot"/>
+        <p:cTn xmlns:p14="http://schemas.microsoft.com/office/powerpoint/2010/main" id="1" dur="indefinite" restart="never" nodeType="tmRoot"/>
       </p:par>
     </p:tnLst>
   </p:timing>

</xml_diff>